<commit_message>
Actualiza 5 y 6
</commit_message>
<xml_diff>
--- a/ppt/Curso Elementos de Desarrollo Web - 5.pptx
+++ b/ppt/Curso Elementos de Desarrollo Web - 5.pptx
@@ -31,35 +31,36 @@
     <p:sldId id="276" r:id="rId26"/>
     <p:sldId id="277" r:id="rId27"/>
     <p:sldId id="278" r:id="rId28"/>
+    <p:sldId id="279" r:id="rId29"/>
   </p:sldIdLst>
   <p:sldSz cy="5143500" cx="9144000"/>
   <p:notesSz cx="6858000" cy="9144000"/>
   <p:embeddedFontLst>
     <p:embeddedFont>
       <p:font typeface="Roboto"/>
-      <p:regular r:id="rId29"/>
-      <p:bold r:id="rId30"/>
-      <p:italic r:id="rId31"/>
-      <p:boldItalic r:id="rId32"/>
+      <p:regular r:id="rId30"/>
+      <p:bold r:id="rId31"/>
+      <p:italic r:id="rId32"/>
+      <p:boldItalic r:id="rId33"/>
     </p:embeddedFont>
     <p:embeddedFont>
       <p:font typeface="Oswald"/>
-      <p:regular r:id="rId33"/>
-      <p:bold r:id="rId34"/>
+      <p:regular r:id="rId34"/>
+      <p:bold r:id="rId35"/>
     </p:embeddedFont>
     <p:embeddedFont>
       <p:font typeface="Roboto Mono"/>
-      <p:regular r:id="rId35"/>
-      <p:bold r:id="rId36"/>
-      <p:italic r:id="rId37"/>
-      <p:boldItalic r:id="rId38"/>
+      <p:regular r:id="rId36"/>
+      <p:bold r:id="rId37"/>
+      <p:italic r:id="rId38"/>
+      <p:boldItalic r:id="rId39"/>
     </p:embeddedFont>
     <p:embeddedFont>
       <p:font typeface="Open Sans"/>
-      <p:regular r:id="rId39"/>
-      <p:bold r:id="rId40"/>
-      <p:italic r:id="rId41"/>
-      <p:boldItalic r:id="rId42"/>
+      <p:regular r:id="rId40"/>
+      <p:bold r:id="rId41"/>
+      <p:italic r:id="rId42"/>
+      <p:boldItalic r:id="rId43"/>
     </p:embeddedFont>
   </p:embeddedFontLst>
   <p:defaultTextStyle>
@@ -1547,7 +1548,7 @@
       </p:grpSpPr>
       <p:sp>
         <p:nvSpPr>
-          <p:cNvPr id="224" name="Google Shape;224;g20620bd661d_0_0:notes"/>
+          <p:cNvPr id="224" name="Google Shape;224;g2071fb4812b_0_0:notes"/>
           <p:cNvSpPr/>
           <p:nvPr>
             <p:ph idx="2" type="sldImg"/>
@@ -1582,7 +1583,7 @@
       </p:sp>
       <p:sp>
         <p:nvSpPr>
-          <p:cNvPr id="225" name="Google Shape;225;g20620bd661d_0_0:notes"/>
+          <p:cNvPr id="225" name="Google Shape;225;g2071fb4812b_0_0:notes"/>
           <p:cNvSpPr txBox="1"/>
           <p:nvPr>
             <p:ph idx="1" type="body"/>
@@ -1632,7 +1633,7 @@
   <p:cSld>
     <p:spTree>
       <p:nvGrpSpPr>
-        <p:cNvPr id="238" name="Shape 238"/>
+        <p:cNvPr id="228" name="Shape 228"/>
         <p:cNvGrpSpPr/>
         <p:nvPr/>
       </p:nvGrpSpPr>
@@ -1646,7 +1647,7 @@
       </p:grpSpPr>
       <p:sp>
         <p:nvSpPr>
-          <p:cNvPr id="239" name="Google Shape;239;g206f8ecee89_0_68:notes"/>
+          <p:cNvPr id="229" name="Google Shape;229;g2071fb4812b_0_4:notes"/>
           <p:cNvSpPr/>
           <p:nvPr>
             <p:ph idx="2" type="sldImg"/>
@@ -1681,7 +1682,7 @@
       </p:sp>
       <p:sp>
         <p:nvSpPr>
-          <p:cNvPr id="240" name="Google Shape;240;g206f8ecee89_0_68:notes"/>
+          <p:cNvPr id="230" name="Google Shape;230;g2071fb4812b_0_4:notes"/>
           <p:cNvSpPr txBox="1"/>
           <p:nvPr>
             <p:ph idx="1" type="body"/>
@@ -1731,7 +1732,7 @@
   <p:cSld>
     <p:spTree>
       <p:nvGrpSpPr>
-        <p:cNvPr id="252" name="Shape 252"/>
+        <p:cNvPr id="243" name="Shape 243"/>
         <p:cNvGrpSpPr/>
         <p:nvPr/>
       </p:nvGrpSpPr>
@@ -1745,7 +1746,7 @@
       </p:grpSpPr>
       <p:sp>
         <p:nvSpPr>
-          <p:cNvPr id="253" name="Google Shape;253;g206f8ecee89_0_47:notes"/>
+          <p:cNvPr id="244" name="Google Shape;244;g2071fb4812b_0_18:notes"/>
           <p:cNvSpPr/>
           <p:nvPr>
             <p:ph idx="2" type="sldImg"/>
@@ -1780,7 +1781,7 @@
       </p:sp>
       <p:sp>
         <p:nvSpPr>
-          <p:cNvPr id="254" name="Google Shape;254;g206f8ecee89_0_47:notes"/>
+          <p:cNvPr id="245" name="Google Shape;245;g2071fb4812b_0_18:notes"/>
           <p:cNvSpPr txBox="1"/>
           <p:nvPr>
             <p:ph idx="1" type="body"/>
@@ -1929,7 +1930,7 @@
   <p:cSld>
     <p:spTree>
       <p:nvGrpSpPr>
-        <p:cNvPr id="274" name="Shape 274"/>
+        <p:cNvPr id="257" name="Shape 257"/>
         <p:cNvGrpSpPr/>
         <p:nvPr/>
       </p:nvGrpSpPr>
@@ -1943,7 +1944,7 @@
       </p:grpSpPr>
       <p:sp>
         <p:nvSpPr>
-          <p:cNvPr id="275" name="Google Shape;275;g206f8ecee89_0_89:notes"/>
+          <p:cNvPr id="258" name="Google Shape;258;g2071fb4812b_0_31:notes"/>
           <p:cNvSpPr/>
           <p:nvPr>
             <p:ph idx="2" type="sldImg"/>
@@ -1978,7 +1979,7 @@
       </p:sp>
       <p:sp>
         <p:nvSpPr>
-          <p:cNvPr id="276" name="Google Shape;276;g206f8ecee89_0_89:notes"/>
+          <p:cNvPr id="259" name="Google Shape;259;g2071fb4812b_0_31:notes"/>
           <p:cNvSpPr txBox="1"/>
           <p:nvPr>
             <p:ph idx="1" type="body"/>
@@ -2028,7 +2029,7 @@
   <p:cSld>
     <p:spTree>
       <p:nvGrpSpPr>
-        <p:cNvPr id="280" name="Shape 280"/>
+        <p:cNvPr id="279" name="Shape 279"/>
         <p:cNvGrpSpPr/>
         <p:nvPr/>
       </p:nvGrpSpPr>
@@ -2042,7 +2043,7 @@
       </p:grpSpPr>
       <p:sp>
         <p:nvSpPr>
-          <p:cNvPr id="281" name="Google Shape;281;g2028100c552_0_408:notes"/>
+          <p:cNvPr id="280" name="Google Shape;280;g206f8ecee89_0_89:notes"/>
           <p:cNvSpPr/>
           <p:nvPr>
             <p:ph idx="2" type="sldImg"/>
@@ -2077,7 +2078,7 @@
       </p:sp>
       <p:sp>
         <p:nvSpPr>
-          <p:cNvPr id="282" name="Google Shape;282;g2028100c552_0_408:notes"/>
+          <p:cNvPr id="281" name="Google Shape;281;g206f8ecee89_0_89:notes"/>
           <p:cNvSpPr txBox="1"/>
           <p:nvPr>
             <p:ph idx="1" type="body"/>
@@ -2141,7 +2142,7 @@
       </p:grpSpPr>
       <p:sp>
         <p:nvSpPr>
-          <p:cNvPr id="286" name="Google Shape;286;g20472d658a1_0_287:notes"/>
+          <p:cNvPr id="286" name="Google Shape;286;g2028100c552_0_408:notes"/>
           <p:cNvSpPr/>
           <p:nvPr>
             <p:ph idx="2" type="sldImg"/>
@@ -2176,7 +2177,7 @@
       </p:sp>
       <p:sp>
         <p:nvSpPr>
-          <p:cNvPr id="287" name="Google Shape;287;g20472d658a1_0_287:notes"/>
+          <p:cNvPr id="287" name="Google Shape;287;g2028100c552_0_408:notes"/>
           <p:cNvSpPr txBox="1"/>
           <p:nvPr>
             <p:ph idx="1" type="body"/>
@@ -2226,7 +2227,7 @@
   <p:cSld>
     <p:spTree>
       <p:nvGrpSpPr>
-        <p:cNvPr id="291" name="Shape 291"/>
+        <p:cNvPr id="290" name="Shape 290"/>
         <p:cNvGrpSpPr/>
         <p:nvPr/>
       </p:nvGrpSpPr>
@@ -2240,7 +2241,7 @@
       </p:grpSpPr>
       <p:sp>
         <p:nvSpPr>
-          <p:cNvPr id="292" name="Google Shape;292;g2028100c552_0_412:notes"/>
+          <p:cNvPr id="291" name="Google Shape;291;g20472d658a1_0_287:notes"/>
           <p:cNvSpPr/>
           <p:nvPr>
             <p:ph idx="2" type="sldImg"/>
@@ -2275,7 +2276,106 @@
       </p:sp>
       <p:sp>
         <p:nvSpPr>
-          <p:cNvPr id="293" name="Google Shape;293;g2028100c552_0_412:notes"/>
+          <p:cNvPr id="292" name="Google Shape;292;g20472d658a1_0_287:notes"/>
+          <p:cNvSpPr txBox="1"/>
+          <p:nvPr>
+            <p:ph idx="1" type="body"/>
+          </p:nvPr>
+        </p:nvSpPr>
+        <p:spPr>
+          <a:xfrm>
+            <a:off x="685800" y="4343400"/>
+            <a:ext cx="5486400" cy="4114800"/>
+          </a:xfrm>
+          <a:prstGeom prst="rect">
+            <a:avLst/>
+          </a:prstGeom>
+        </p:spPr>
+        <p:txBody>
+          <a:bodyPr anchorCtr="0" anchor="t" bIns="91425" lIns="91425" spcFirstLastPara="1" rIns="91425" wrap="square" tIns="91425">
+            <a:noAutofit/>
+          </a:bodyPr>
+          <a:lstStyle/>
+          <a:p>
+            <a:pPr indent="0" lvl="0" marL="0" rtl="0" algn="l">
+              <a:spcBef>
+                <a:spcPts val="0"/>
+              </a:spcBef>
+              <a:spcAft>
+                <a:spcPts val="0"/>
+              </a:spcAft>
+              <a:buNone/>
+            </a:pPr>
+            <a:r>
+              <a:t/>
+            </a:r>
+            <a:endParaRPr/>
+          </a:p>
+        </p:txBody>
+      </p:sp>
+    </p:spTree>
+  </p:cSld>
+  <p:clrMapOvr>
+    <a:masterClrMapping/>
+  </p:clrMapOvr>
+</p:notes>
+</file>
+
+<file path=ppt/notesSlides/notesSlide24.xml><?xml version="1.0" encoding="utf-8"?>
+<p:notes xmlns:a="http://schemas.openxmlformats.org/drawingml/2006/main" xmlns:r="http://schemas.openxmlformats.org/officeDocument/2006/relationships" xmlns:mc="http://schemas.openxmlformats.org/markup-compatibility/2006" xmlns:mv="urn:schemas-microsoft-com:mac:vml" xmlns:p="http://schemas.openxmlformats.org/presentationml/2006/main" xmlns:c="http://schemas.openxmlformats.org/drawingml/2006/chart" xmlns:dgm="http://schemas.openxmlformats.org/drawingml/2006/diagram" xmlns:o="urn:schemas-microsoft-com:office:office" xmlns:v="urn:schemas-microsoft-com:vml" xmlns:pvml="urn:schemas-microsoft-com:office:powerpoint" xmlns:com="http://schemas.openxmlformats.org/drawingml/2006/compatibility" xmlns:p14="http://schemas.microsoft.com/office/powerpoint/2010/main" xmlns:p15="http://schemas.microsoft.com/office/powerpoint/2012/main" xmlns:ahyp="http://schemas.microsoft.com/office/drawing/2018/hyperlinkcolor" showMasterPhAnim="0" showMasterSp="0">
+  <p:cSld>
+    <p:spTree>
+      <p:nvGrpSpPr>
+        <p:cNvPr id="296" name="Shape 296"/>
+        <p:cNvGrpSpPr/>
+        <p:nvPr/>
+      </p:nvGrpSpPr>
+      <p:grpSpPr>
+        <a:xfrm>
+          <a:off x="0" y="0"/>
+          <a:ext cx="0" cy="0"/>
+          <a:chOff x="0" y="0"/>
+          <a:chExt cx="0" cy="0"/>
+        </a:xfrm>
+      </p:grpSpPr>
+      <p:sp>
+        <p:nvSpPr>
+          <p:cNvPr id="297" name="Google Shape;297;g2028100c552_0_412:notes"/>
+          <p:cNvSpPr/>
+          <p:nvPr>
+            <p:ph idx="2" type="sldImg"/>
+          </p:nvPr>
+        </p:nvSpPr>
+        <p:spPr>
+          <a:xfrm>
+            <a:off x="381300" y="685800"/>
+            <a:ext cx="6096000" cy="3429000"/>
+          </a:xfrm>
+          <a:custGeom>
+            <a:rect b="b" l="l" r="r" t="t"/>
+            <a:pathLst>
+              <a:path extrusionOk="0" h="120000" w="120000">
+                <a:moveTo>
+                  <a:pt x="0" y="0"/>
+                </a:moveTo>
+                <a:lnTo>
+                  <a:pt x="120000" y="0"/>
+                </a:lnTo>
+                <a:lnTo>
+                  <a:pt x="120000" y="120000"/>
+                </a:lnTo>
+                <a:lnTo>
+                  <a:pt x="0" y="120000"/>
+                </a:lnTo>
+                <a:close/>
+              </a:path>
+            </a:pathLst>
+          </a:custGeom>
+        </p:spPr>
+      </p:sp>
+      <p:sp>
+        <p:nvSpPr>
+          <p:cNvPr id="298" name="Google Shape;298;g2028100c552_0_412:notes"/>
           <p:cNvSpPr txBox="1"/>
           <p:nvPr>
             <p:ph idx="1" type="body"/>
@@ -9758,137 +9858,23 @@
       <p:sp>
         <p:nvSpPr>
           <p:cNvPr id="227" name="Google Shape;227;p29"/>
-          <p:cNvSpPr/>
-          <p:nvPr/>
+          <p:cNvSpPr txBox="1"/>
+          <p:nvPr>
+            <p:ph type="title"/>
+          </p:nvPr>
         </p:nvSpPr>
         <p:spPr>
           <a:xfrm>
-            <a:off x="3703350" y="2938175"/>
-            <a:ext cx="1714500" cy="1125600"/>
-          </a:xfrm>
-          <a:prstGeom prst="roundRect">
-            <a:avLst>
-              <a:gd fmla="val 16667" name="adj"/>
-            </a:avLst>
-          </a:prstGeom>
-          <a:solidFill>
-            <a:schemeClr val="lt2"/>
-          </a:solidFill>
-          <a:ln cap="flat" cmpd="sng" w="9525">
-            <a:solidFill>
-              <a:schemeClr val="dk2"/>
-            </a:solidFill>
-            <a:prstDash val="solid"/>
-            <a:round/>
-            <a:headEnd len="sm" w="sm" type="none"/>
-            <a:tailEnd len="sm" w="sm" type="none"/>
-          </a:ln>
+            <a:off x="311700" y="2150850"/>
+            <a:ext cx="8520600" cy="841800"/>
+          </a:xfrm>
+          <a:prstGeom prst="rect">
+            <a:avLst/>
+          </a:prstGeom>
         </p:spPr>
         <p:txBody>
           <a:bodyPr anchorCtr="0" anchor="ctr" bIns="91425" lIns="91425" spcFirstLastPara="1" rIns="91425" wrap="square" tIns="91425">
-            <a:noAutofit/>
-          </a:bodyPr>
-          <a:lstStyle/>
-          <a:p>
-            <a:pPr indent="0" lvl="0" marL="0" rtl="0" algn="l">
-              <a:spcBef>
-                <a:spcPts val="0"/>
-              </a:spcBef>
-              <a:spcAft>
-                <a:spcPts val="0"/>
-              </a:spcAft>
-              <a:buNone/>
-            </a:pPr>
-            <a:r>
-              <a:t/>
-            </a:r>
-            <a:endParaRPr/>
-          </a:p>
-        </p:txBody>
-      </p:sp>
-      <p:sp>
-        <p:nvSpPr>
-          <p:cNvPr id="228" name="Google Shape;228;p29"/>
-          <p:cNvSpPr/>
-          <p:nvPr/>
-        </p:nvSpPr>
-        <p:spPr>
-          <a:xfrm>
-            <a:off x="558275" y="1060113"/>
-            <a:ext cx="863784" cy="628236"/>
-          </a:xfrm>
-          <a:prstGeom prst="flowChartMultidocument">
-            <a:avLst/>
-          </a:prstGeom>
-          <a:solidFill>
-            <a:srgbClr val="00FF00">
-              <a:alpha val="23720"/>
-            </a:srgbClr>
-          </a:solidFill>
-          <a:ln cap="flat" cmpd="sng" w="9525">
-            <a:solidFill>
-              <a:schemeClr val="dk2"/>
-            </a:solidFill>
-            <a:prstDash val="solid"/>
-            <a:round/>
-            <a:headEnd len="sm" w="sm" type="none"/>
-            <a:tailEnd len="sm" w="sm" type="none"/>
-          </a:ln>
-        </p:spPr>
-        <p:txBody>
-          <a:bodyPr anchorCtr="0" anchor="ctr" bIns="91425" lIns="91425" spcFirstLastPara="1" rIns="91425" wrap="square" tIns="91425">
-            <a:noAutofit/>
-          </a:bodyPr>
-          <a:lstStyle/>
-          <a:p>
-            <a:pPr indent="0" lvl="0" marL="0" rtl="0" algn="l">
-              <a:spcBef>
-                <a:spcPts val="0"/>
-              </a:spcBef>
-              <a:spcAft>
-                <a:spcPts val="0"/>
-              </a:spcAft>
-              <a:buNone/>
-            </a:pPr>
-            <a:r>
-              <a:t/>
-            </a:r>
-            <a:endParaRPr/>
-          </a:p>
-        </p:txBody>
-      </p:sp>
-      <p:sp>
-        <p:nvSpPr>
-          <p:cNvPr id="229" name="Google Shape;229;p29"/>
-          <p:cNvSpPr/>
-          <p:nvPr/>
-        </p:nvSpPr>
-        <p:spPr>
-          <a:xfrm>
-            <a:off x="1713117" y="991275"/>
-            <a:ext cx="1204200" cy="765900"/>
-          </a:xfrm>
-          <a:prstGeom prst="rect">
-            <a:avLst/>
-          </a:prstGeom>
-          <a:solidFill>
-            <a:srgbClr val="00FF00">
-              <a:alpha val="23720"/>
-            </a:srgbClr>
-          </a:solidFill>
-          <a:ln cap="flat" cmpd="sng" w="9525">
-            <a:solidFill>
-              <a:schemeClr val="dk2"/>
-            </a:solidFill>
-            <a:prstDash val="solid"/>
-            <a:round/>
-            <a:headEnd len="sm" w="sm" type="none"/>
-            <a:tailEnd len="sm" w="sm" type="none"/>
-          </a:ln>
-        </p:spPr>
-        <p:txBody>
-          <a:bodyPr anchorCtr="0" anchor="ctr" bIns="91425" lIns="91425" spcFirstLastPara="1" rIns="91425" wrap="square" tIns="91425">
-            <a:noAutofit/>
+            <a:normAutofit/>
           </a:bodyPr>
           <a:lstStyle/>
           <a:p>
@@ -9902,365 +9888,10 @@
               <a:buNone/>
             </a:pPr>
             <a:r>
-              <a:rPr lang="es-419">
-                <a:latin typeface="Oswald"/>
-                <a:ea typeface="Oswald"/>
-                <a:cs typeface="Oswald"/>
-                <a:sym typeface="Oswald"/>
-              </a:rPr>
-              <a:t>BUILD</a:t>
-            </a:r>
-            <a:endParaRPr>
-              <a:latin typeface="Oswald"/>
-              <a:ea typeface="Oswald"/>
-              <a:cs typeface="Oswald"/>
-              <a:sym typeface="Oswald"/>
-            </a:endParaRPr>
-          </a:p>
-        </p:txBody>
-      </p:sp>
-      <p:sp>
-        <p:nvSpPr>
-          <p:cNvPr id="230" name="Google Shape;230;p29"/>
-          <p:cNvSpPr/>
-          <p:nvPr/>
-        </p:nvSpPr>
-        <p:spPr>
-          <a:xfrm>
-            <a:off x="3912750" y="3062525"/>
-            <a:ext cx="1295700" cy="876900"/>
-          </a:xfrm>
-          <a:prstGeom prst="rect">
-            <a:avLst/>
-          </a:prstGeom>
-          <a:solidFill>
-            <a:srgbClr val="CFE2F3"/>
-          </a:solidFill>
-          <a:ln cap="flat" cmpd="sng" w="9525">
-            <a:solidFill>
-              <a:schemeClr val="dk2"/>
-            </a:solidFill>
-            <a:prstDash val="solid"/>
-            <a:round/>
-            <a:headEnd len="sm" w="sm" type="none"/>
-            <a:tailEnd len="sm" w="sm" type="none"/>
-          </a:ln>
-        </p:spPr>
-        <p:txBody>
-          <a:bodyPr anchorCtr="0" anchor="ctr" bIns="91425" lIns="91425" spcFirstLastPara="1" rIns="91425" wrap="square" tIns="91425">
-            <a:noAutofit/>
-          </a:bodyPr>
-          <a:lstStyle/>
-          <a:p>
-            <a:pPr indent="0" lvl="0" marL="0" rtl="0" algn="ctr">
-              <a:spcBef>
-                <a:spcPts val="0"/>
-              </a:spcBef>
-              <a:spcAft>
-                <a:spcPts val="0"/>
-              </a:spcAft>
-              <a:buNone/>
-            </a:pPr>
-            <a:r>
-              <a:rPr lang="es-419">
-                <a:latin typeface="Oswald"/>
-                <a:ea typeface="Oswald"/>
-                <a:cs typeface="Oswald"/>
-                <a:sym typeface="Oswald"/>
-              </a:rPr>
-              <a:t>NAVEGADOR</a:t>
-            </a:r>
-            <a:endParaRPr>
-              <a:latin typeface="Oswald"/>
-              <a:ea typeface="Oswald"/>
-              <a:cs typeface="Oswald"/>
-              <a:sym typeface="Oswald"/>
-            </a:endParaRPr>
-          </a:p>
-        </p:txBody>
-      </p:sp>
-      <p:cxnSp>
-        <p:nvCxnSpPr>
-          <p:cNvPr id="231" name="Google Shape;231;p29"/>
-          <p:cNvCxnSpPr>
-            <a:stCxn id="228" idx="3"/>
-            <a:endCxn id="229" idx="1"/>
-          </p:cNvCxnSpPr>
-          <p:nvPr/>
-        </p:nvCxnSpPr>
-        <p:spPr>
-          <a:xfrm>
-            <a:off x="1422059" y="1374231"/>
-            <a:ext cx="291000" cy="0"/>
-          </a:xfrm>
-          <a:prstGeom prst="straightConnector1">
-            <a:avLst/>
-          </a:prstGeom>
-          <a:noFill/>
-          <a:ln cap="flat" cmpd="sng" w="19050">
-            <a:solidFill>
-              <a:schemeClr val="dk2"/>
-            </a:solidFill>
-            <a:prstDash val="solid"/>
-            <a:round/>
-            <a:headEnd len="med" w="med" type="none"/>
-            <a:tailEnd len="med" w="med" type="triangle"/>
-          </a:ln>
-        </p:spPr>
-      </p:cxnSp>
-      <p:cxnSp>
-        <p:nvCxnSpPr>
-          <p:cNvPr id="232" name="Google Shape;232;p29"/>
-          <p:cNvCxnSpPr>
-            <a:stCxn id="229" idx="3"/>
-            <a:endCxn id="233" idx="2"/>
-          </p:cNvCxnSpPr>
-          <p:nvPr/>
-        </p:nvCxnSpPr>
-        <p:spPr>
-          <a:xfrm>
-            <a:off x="2917317" y="1374225"/>
-            <a:ext cx="291000" cy="0"/>
-          </a:xfrm>
-          <a:prstGeom prst="straightConnector1">
-            <a:avLst/>
-          </a:prstGeom>
-          <a:noFill/>
-          <a:ln cap="flat" cmpd="sng" w="19050">
-            <a:solidFill>
-              <a:schemeClr val="dk2"/>
-            </a:solidFill>
-            <a:prstDash val="solid"/>
-            <a:round/>
-            <a:headEnd len="med" w="med" type="none"/>
-            <a:tailEnd len="med" w="med" type="triangle"/>
-          </a:ln>
-        </p:spPr>
-      </p:cxnSp>
-      <p:cxnSp>
-        <p:nvCxnSpPr>
-          <p:cNvPr id="234" name="Google Shape;234;p29"/>
-          <p:cNvCxnSpPr>
-            <a:stCxn id="235" idx="3"/>
-            <a:endCxn id="230" idx="1"/>
-          </p:cNvCxnSpPr>
-          <p:nvPr/>
-        </p:nvCxnSpPr>
-        <p:spPr>
-          <a:xfrm flipH="1">
-            <a:off x="3912772" y="1374206"/>
-            <a:ext cx="122700" cy="2126700"/>
-          </a:xfrm>
-          <a:prstGeom prst="bentConnector5">
-            <a:avLst>
-              <a:gd fmla="val -194071" name="adj1"/>
-              <a:gd fmla="val 47048" name="adj2"/>
-              <a:gd fmla="val 558269" name="adj3"/>
-            </a:avLst>
-          </a:prstGeom>
-          <a:noFill/>
-          <a:ln cap="flat" cmpd="sng" w="19050">
-            <a:solidFill>
-              <a:schemeClr val="dk2"/>
-            </a:solidFill>
-            <a:prstDash val="solid"/>
-            <a:round/>
-            <a:headEnd len="med" w="med" type="none"/>
-            <a:tailEnd len="med" w="med" type="triangle"/>
-          </a:ln>
-        </p:spPr>
-      </p:cxnSp>
-      <p:sp>
-        <p:nvSpPr>
-          <p:cNvPr id="236" name="Google Shape;236;p29"/>
-          <p:cNvSpPr txBox="1"/>
-          <p:nvPr/>
-        </p:nvSpPr>
-        <p:spPr>
-          <a:xfrm>
-            <a:off x="558275" y="366450"/>
-            <a:ext cx="3751800" cy="461700"/>
-          </a:xfrm>
-          <a:prstGeom prst="rect">
-            <a:avLst/>
-          </a:prstGeom>
-          <a:noFill/>
-          <a:ln>
-            <a:noFill/>
-          </a:ln>
-        </p:spPr>
-        <p:txBody>
-          <a:bodyPr anchorCtr="0" anchor="t" bIns="91425" lIns="91425" spcFirstLastPara="1" rIns="91425" wrap="square" tIns="91425">
-            <a:spAutoFit/>
-          </a:bodyPr>
-          <a:lstStyle/>
-          <a:p>
-            <a:pPr indent="0" lvl="0" marL="0" rtl="0" algn="ctr">
-              <a:spcBef>
-                <a:spcPts val="0"/>
-              </a:spcBef>
-              <a:spcAft>
-                <a:spcPts val="0"/>
-              </a:spcAft>
-              <a:buNone/>
-            </a:pPr>
-            <a:r>
-              <a:rPr lang="es-419" sz="1800">
-                <a:latin typeface="Oswald"/>
-                <a:ea typeface="Oswald"/>
-                <a:cs typeface="Oswald"/>
-                <a:sym typeface="Oswald"/>
-              </a:rPr>
-              <a:t>FRONTEND</a:t>
-            </a:r>
-            <a:endParaRPr sz="1800">
-              <a:latin typeface="Oswald"/>
-              <a:ea typeface="Oswald"/>
-              <a:cs typeface="Oswald"/>
-              <a:sym typeface="Oswald"/>
-            </a:endParaRPr>
-          </a:p>
-        </p:txBody>
-      </p:sp>
-      <p:sp>
-        <p:nvSpPr>
-          <p:cNvPr id="237" name="Google Shape;237;p29"/>
-          <p:cNvSpPr txBox="1"/>
-          <p:nvPr>
-            <p:ph idx="1" type="body"/>
-          </p:nvPr>
-        </p:nvSpPr>
-        <p:spPr>
-          <a:xfrm>
-            <a:off x="311700" y="4273200"/>
-            <a:ext cx="8497800" cy="765900"/>
-          </a:xfrm>
-          <a:prstGeom prst="rect">
-            <a:avLst/>
-          </a:prstGeom>
-        </p:spPr>
-        <p:txBody>
-          <a:bodyPr anchorCtr="0" anchor="t" bIns="91425" lIns="91425" spcFirstLastPara="1" rIns="91425" wrap="square" tIns="91425">
-            <a:normAutofit fontScale="77500" lnSpcReduction="10000"/>
-          </a:bodyPr>
-          <a:lstStyle/>
-          <a:p>
-            <a:pPr indent="0" lvl="0" marL="0" rtl="0" algn="ctr">
-              <a:spcBef>
-                <a:spcPts val="0"/>
-              </a:spcBef>
-              <a:spcAft>
-                <a:spcPts val="1200"/>
-              </a:spcAft>
-              <a:buNone/>
-            </a:pPr>
-            <a:r>
-              <a:rPr b="1" lang="es-419" sz="2400">
-                <a:latin typeface="Open Sans"/>
-                <a:ea typeface="Open Sans"/>
-                <a:cs typeface="Open Sans"/>
-                <a:sym typeface="Open Sans"/>
-              </a:rPr>
-              <a:t>Caso</a:t>
-            </a:r>
-            <a:r>
-              <a:rPr b="1" lang="es-419" sz="2400">
-                <a:latin typeface="Open Sans"/>
-                <a:ea typeface="Open Sans"/>
-                <a:cs typeface="Open Sans"/>
-                <a:sym typeface="Open Sans"/>
-              </a:rPr>
-              <a:t> </a:t>
-            </a:r>
-            <a:r>
-              <a:rPr b="1" lang="es-419" sz="2400">
-                <a:solidFill>
-                  <a:srgbClr val="1155CC"/>
-                </a:solidFill>
-                <a:latin typeface="Open Sans"/>
-                <a:ea typeface="Open Sans"/>
-                <a:cs typeface="Open Sans"/>
-                <a:sym typeface="Open Sans"/>
-              </a:rPr>
-              <a:t>página estática</a:t>
-            </a:r>
-            <a:r>
-              <a:rPr b="1" lang="es-419" sz="2400">
-                <a:latin typeface="Open Sans"/>
-                <a:ea typeface="Open Sans"/>
-                <a:cs typeface="Open Sans"/>
-                <a:sym typeface="Open Sans"/>
-              </a:rPr>
-              <a:t>: el navegador muestra HTML proveniente de archivos HTML </a:t>
-            </a:r>
-            <a:endParaRPr b="1" sz="2400">
-              <a:latin typeface="Open Sans"/>
-              <a:ea typeface="Open Sans"/>
-              <a:cs typeface="Open Sans"/>
-              <a:sym typeface="Open Sans"/>
-            </a:endParaRPr>
-          </a:p>
-        </p:txBody>
-      </p:sp>
-      <p:sp>
-        <p:nvSpPr>
-          <p:cNvPr id="235" name="Google Shape;235;p29"/>
-          <p:cNvSpPr/>
-          <p:nvPr/>
-        </p:nvSpPr>
-        <p:spPr>
-          <a:xfrm>
-            <a:off x="3171688" y="1060088"/>
-            <a:ext cx="863784" cy="628236"/>
-          </a:xfrm>
-          <a:prstGeom prst="flowChartMultidocument">
-            <a:avLst/>
-          </a:prstGeom>
-          <a:solidFill>
-            <a:srgbClr val="00FF00">
-              <a:alpha val="23720"/>
-            </a:srgbClr>
-          </a:solidFill>
-          <a:ln cap="flat" cmpd="sng" w="9525">
-            <a:solidFill>
-              <a:schemeClr val="dk2"/>
-            </a:solidFill>
-            <a:prstDash val="solid"/>
-            <a:round/>
-            <a:headEnd len="sm" w="sm" type="none"/>
-            <a:tailEnd len="sm" w="sm" type="none"/>
-          </a:ln>
-        </p:spPr>
-        <p:txBody>
-          <a:bodyPr anchorCtr="0" anchor="ctr" bIns="91425" lIns="91425" spcFirstLastPara="1" rIns="91425" wrap="square" tIns="91425">
-            <a:noAutofit/>
-          </a:bodyPr>
-          <a:lstStyle/>
-          <a:p>
-            <a:pPr indent="0" lvl="0" marL="0" rtl="0" algn="ctr">
-              <a:spcBef>
-                <a:spcPts val="0"/>
-              </a:spcBef>
-              <a:spcAft>
-                <a:spcPts val="0"/>
-              </a:spcAft>
-              <a:buNone/>
-            </a:pPr>
-            <a:r>
-              <a:rPr lang="es-419">
-                <a:latin typeface="Oswald"/>
-                <a:ea typeface="Oswald"/>
-                <a:cs typeface="Oswald"/>
-                <a:sym typeface="Oswald"/>
-              </a:rPr>
-              <a:t>HTML</a:t>
-            </a:r>
-            <a:endParaRPr>
-              <a:latin typeface="Oswald"/>
-              <a:ea typeface="Oswald"/>
-              <a:cs typeface="Oswald"/>
-              <a:sym typeface="Oswald"/>
-            </a:endParaRPr>
+              <a:rPr lang="es-419"/>
+              <a:t>Node: MVC</a:t>
+            </a:r>
+            <a:endParaRPr/>
           </a:p>
         </p:txBody>
       </p:sp>
@@ -10277,7 +9908,7 @@
   <p:cSld>
     <p:spTree>
       <p:nvGrpSpPr>
-        <p:cNvPr id="241" name="Shape 241"/>
+        <p:cNvPr id="231" name="Shape 231"/>
         <p:cNvGrpSpPr/>
         <p:nvPr/>
       </p:nvGrpSpPr>
@@ -10291,7 +9922,7 @@
       </p:grpSpPr>
       <p:sp>
         <p:nvSpPr>
-          <p:cNvPr id="242" name="Google Shape;242;p30"/>
+          <p:cNvPr id="232" name="Google Shape;232;p30"/>
           <p:cNvSpPr/>
           <p:nvPr/>
         </p:nvSpPr>
@@ -10342,713 +9973,7 @@
       </p:sp>
       <p:sp>
         <p:nvSpPr>
-          <p:cNvPr id="243" name="Google Shape;243;p30"/>
-          <p:cNvSpPr/>
-          <p:nvPr/>
-        </p:nvSpPr>
-        <p:spPr>
-          <a:xfrm>
-            <a:off x="7721950" y="1060100"/>
-            <a:ext cx="863784" cy="628236"/>
-          </a:xfrm>
-          <a:prstGeom prst="flowChartMultidocument">
-            <a:avLst/>
-          </a:prstGeom>
-          <a:solidFill>
-            <a:srgbClr val="F6B26B"/>
-          </a:solidFill>
-          <a:ln cap="flat" cmpd="sng" w="9525">
-            <a:solidFill>
-              <a:schemeClr val="dk2"/>
-            </a:solidFill>
-            <a:prstDash val="solid"/>
-            <a:round/>
-            <a:headEnd len="sm" w="sm" type="none"/>
-            <a:tailEnd len="sm" w="sm" type="none"/>
-          </a:ln>
-        </p:spPr>
-        <p:txBody>
-          <a:bodyPr anchorCtr="0" anchor="ctr" bIns="91425" lIns="91425" spcFirstLastPara="1" rIns="91425" wrap="square" tIns="91425">
-            <a:noAutofit/>
-          </a:bodyPr>
-          <a:lstStyle/>
-          <a:p>
-            <a:pPr indent="0" lvl="0" marL="0" rtl="0" algn="l">
-              <a:spcBef>
-                <a:spcPts val="0"/>
-              </a:spcBef>
-              <a:spcAft>
-                <a:spcPts val="0"/>
-              </a:spcAft>
-              <a:buNone/>
-            </a:pPr>
-            <a:r>
-              <a:t/>
-            </a:r>
-            <a:endParaRPr/>
-          </a:p>
-        </p:txBody>
-      </p:sp>
-      <p:sp>
-        <p:nvSpPr>
-          <p:cNvPr id="244" name="Google Shape;244;p30"/>
-          <p:cNvSpPr/>
-          <p:nvPr/>
-        </p:nvSpPr>
-        <p:spPr>
-          <a:xfrm>
-            <a:off x="6151400" y="991263"/>
-            <a:ext cx="1204200" cy="765900"/>
-          </a:xfrm>
-          <a:prstGeom prst="rect">
-            <a:avLst/>
-          </a:prstGeom>
-          <a:solidFill>
-            <a:srgbClr val="F6B26B"/>
-          </a:solidFill>
-          <a:ln cap="flat" cmpd="sng" w="9525">
-            <a:solidFill>
-              <a:schemeClr val="dk2"/>
-            </a:solidFill>
-            <a:prstDash val="solid"/>
-            <a:round/>
-            <a:headEnd len="sm" w="sm" type="none"/>
-            <a:tailEnd len="sm" w="sm" type="none"/>
-          </a:ln>
-        </p:spPr>
-        <p:txBody>
-          <a:bodyPr anchorCtr="0" anchor="ctr" bIns="91425" lIns="91425" spcFirstLastPara="1" rIns="91425" wrap="square" tIns="91425">
-            <a:noAutofit/>
-          </a:bodyPr>
-          <a:lstStyle/>
-          <a:p>
-            <a:pPr indent="0" lvl="0" marL="0" rtl="0" algn="ctr">
-              <a:spcBef>
-                <a:spcPts val="0"/>
-              </a:spcBef>
-              <a:spcAft>
-                <a:spcPts val="0"/>
-              </a:spcAft>
-              <a:buNone/>
-            </a:pPr>
-            <a:r>
-              <a:rPr lang="es-419">
-                <a:latin typeface="Oswald"/>
-                <a:ea typeface="Oswald"/>
-                <a:cs typeface="Oswald"/>
-                <a:sym typeface="Oswald"/>
-              </a:rPr>
-              <a:t>SERVICIO</a:t>
-            </a:r>
-            <a:endParaRPr>
-              <a:latin typeface="Oswald"/>
-              <a:ea typeface="Oswald"/>
-              <a:cs typeface="Oswald"/>
-              <a:sym typeface="Oswald"/>
-            </a:endParaRPr>
-          </a:p>
-        </p:txBody>
-      </p:sp>
-      <p:sp>
-        <p:nvSpPr>
-          <p:cNvPr id="245" name="Google Shape;245;p30"/>
-          <p:cNvSpPr/>
-          <p:nvPr/>
-        </p:nvSpPr>
-        <p:spPr>
-          <a:xfrm>
-            <a:off x="4921275" y="991275"/>
-            <a:ext cx="863700" cy="765900"/>
-          </a:xfrm>
-          <a:prstGeom prst="ellipse">
-            <a:avLst/>
-          </a:prstGeom>
-          <a:solidFill>
-            <a:srgbClr val="F6B26B"/>
-          </a:solidFill>
-          <a:ln cap="flat" cmpd="sng" w="9525">
-            <a:solidFill>
-              <a:schemeClr val="dk2"/>
-            </a:solidFill>
-            <a:prstDash val="solid"/>
-            <a:round/>
-            <a:headEnd len="sm" w="sm" type="none"/>
-            <a:tailEnd len="sm" w="sm" type="none"/>
-          </a:ln>
-        </p:spPr>
-        <p:txBody>
-          <a:bodyPr anchorCtr="0" anchor="ctr" bIns="91425" lIns="91425" spcFirstLastPara="1" rIns="91425" wrap="square" tIns="91425">
-            <a:noAutofit/>
-          </a:bodyPr>
-          <a:lstStyle/>
-          <a:p>
-            <a:pPr indent="0" lvl="0" marL="0" rtl="0" algn="ctr">
-              <a:spcBef>
-                <a:spcPts val="0"/>
-              </a:spcBef>
-              <a:spcAft>
-                <a:spcPts val="0"/>
-              </a:spcAft>
-              <a:buNone/>
-            </a:pPr>
-            <a:r>
-              <a:rPr lang="es-419">
-                <a:latin typeface="Oswald"/>
-                <a:ea typeface="Oswald"/>
-                <a:cs typeface="Oswald"/>
-                <a:sym typeface="Oswald"/>
-              </a:rPr>
-              <a:t>HTML</a:t>
-            </a:r>
-            <a:endParaRPr>
-              <a:latin typeface="Oswald"/>
-              <a:ea typeface="Oswald"/>
-              <a:cs typeface="Oswald"/>
-              <a:sym typeface="Oswald"/>
-            </a:endParaRPr>
-          </a:p>
-        </p:txBody>
-      </p:sp>
-      <p:sp>
-        <p:nvSpPr>
-          <p:cNvPr id="246" name="Google Shape;246;p30"/>
-          <p:cNvSpPr/>
-          <p:nvPr/>
-        </p:nvSpPr>
-        <p:spPr>
-          <a:xfrm>
-            <a:off x="3912750" y="3062525"/>
-            <a:ext cx="1295700" cy="876900"/>
-          </a:xfrm>
-          <a:prstGeom prst="rect">
-            <a:avLst/>
-          </a:prstGeom>
-          <a:solidFill>
-            <a:srgbClr val="CFE2F3"/>
-          </a:solidFill>
-          <a:ln cap="flat" cmpd="sng" w="9525">
-            <a:solidFill>
-              <a:schemeClr val="dk2"/>
-            </a:solidFill>
-            <a:prstDash val="solid"/>
-            <a:round/>
-            <a:headEnd len="sm" w="sm" type="none"/>
-            <a:tailEnd len="sm" w="sm" type="none"/>
-          </a:ln>
-        </p:spPr>
-        <p:txBody>
-          <a:bodyPr anchorCtr="0" anchor="ctr" bIns="91425" lIns="91425" spcFirstLastPara="1" rIns="91425" wrap="square" tIns="91425">
-            <a:noAutofit/>
-          </a:bodyPr>
-          <a:lstStyle/>
-          <a:p>
-            <a:pPr indent="0" lvl="0" marL="0" rtl="0" algn="ctr">
-              <a:spcBef>
-                <a:spcPts val="0"/>
-              </a:spcBef>
-              <a:spcAft>
-                <a:spcPts val="0"/>
-              </a:spcAft>
-              <a:buNone/>
-            </a:pPr>
-            <a:r>
-              <a:rPr lang="es-419">
-                <a:latin typeface="Oswald"/>
-                <a:ea typeface="Oswald"/>
-                <a:cs typeface="Oswald"/>
-                <a:sym typeface="Oswald"/>
-              </a:rPr>
-              <a:t>NAVEGADOR</a:t>
-            </a:r>
-            <a:endParaRPr>
-              <a:latin typeface="Oswald"/>
-              <a:ea typeface="Oswald"/>
-              <a:cs typeface="Oswald"/>
-              <a:sym typeface="Oswald"/>
-            </a:endParaRPr>
-          </a:p>
-        </p:txBody>
-      </p:sp>
-      <p:cxnSp>
-        <p:nvCxnSpPr>
-          <p:cNvPr id="247" name="Google Shape;247;p30"/>
-          <p:cNvCxnSpPr>
-            <a:stCxn id="243" idx="1"/>
-            <a:endCxn id="244" idx="3"/>
-          </p:cNvCxnSpPr>
-          <p:nvPr/>
-        </p:nvCxnSpPr>
-        <p:spPr>
-          <a:xfrm rot="10800000">
-            <a:off x="7355650" y="1374218"/>
-            <a:ext cx="366300" cy="0"/>
-          </a:xfrm>
-          <a:prstGeom prst="straightConnector1">
-            <a:avLst/>
-          </a:prstGeom>
-          <a:noFill/>
-          <a:ln cap="flat" cmpd="sng" w="19050">
-            <a:solidFill>
-              <a:schemeClr val="dk2"/>
-            </a:solidFill>
-            <a:prstDash val="solid"/>
-            <a:round/>
-            <a:headEnd len="med" w="med" type="none"/>
-            <a:tailEnd len="med" w="med" type="triangle"/>
-          </a:ln>
-        </p:spPr>
-      </p:cxnSp>
-      <p:cxnSp>
-        <p:nvCxnSpPr>
-          <p:cNvPr id="248" name="Google Shape;248;p30"/>
-          <p:cNvCxnSpPr>
-            <a:stCxn id="244" idx="1"/>
-            <a:endCxn id="245" idx="6"/>
-          </p:cNvCxnSpPr>
-          <p:nvPr/>
-        </p:nvCxnSpPr>
-        <p:spPr>
-          <a:xfrm rot="10800000">
-            <a:off x="5785100" y="1374213"/>
-            <a:ext cx="366300" cy="0"/>
-          </a:xfrm>
-          <a:prstGeom prst="straightConnector1">
-            <a:avLst/>
-          </a:prstGeom>
-          <a:noFill/>
-          <a:ln cap="flat" cmpd="sng" w="19050">
-            <a:solidFill>
-              <a:schemeClr val="dk2"/>
-            </a:solidFill>
-            <a:prstDash val="solid"/>
-            <a:round/>
-            <a:headEnd len="med" w="med" type="none"/>
-            <a:tailEnd len="med" w="med" type="triangle"/>
-          </a:ln>
-        </p:spPr>
-      </p:cxnSp>
-      <p:cxnSp>
-        <p:nvCxnSpPr>
-          <p:cNvPr id="249" name="Google Shape;249;p30"/>
-          <p:cNvCxnSpPr>
-            <a:stCxn id="245" idx="2"/>
-            <a:endCxn id="246" idx="3"/>
-          </p:cNvCxnSpPr>
-          <p:nvPr/>
-        </p:nvCxnSpPr>
-        <p:spPr>
-          <a:xfrm>
-            <a:off x="4921275" y="1374225"/>
-            <a:ext cx="287100" cy="2126700"/>
-          </a:xfrm>
-          <a:prstGeom prst="bentConnector5">
-            <a:avLst>
-              <a:gd fmla="val -82941" name="adj1"/>
-              <a:gd fmla="val 48696" name="adj2"/>
-              <a:gd fmla="val 328126" name="adj3"/>
-            </a:avLst>
-          </a:prstGeom>
-          <a:noFill/>
-          <a:ln cap="flat" cmpd="sng" w="19050">
-            <a:solidFill>
-              <a:schemeClr val="dk2"/>
-            </a:solidFill>
-            <a:prstDash val="solid"/>
-            <a:round/>
-            <a:headEnd len="med" w="med" type="none"/>
-            <a:tailEnd len="med" w="med" type="triangle"/>
-          </a:ln>
-        </p:spPr>
-      </p:cxnSp>
-      <p:sp>
-        <p:nvSpPr>
-          <p:cNvPr id="250" name="Google Shape;250;p30"/>
-          <p:cNvSpPr txBox="1"/>
-          <p:nvPr/>
-        </p:nvSpPr>
-        <p:spPr>
-          <a:xfrm>
-            <a:off x="4683150" y="366450"/>
-            <a:ext cx="3902700" cy="461700"/>
-          </a:xfrm>
-          <a:prstGeom prst="rect">
-            <a:avLst/>
-          </a:prstGeom>
-          <a:noFill/>
-          <a:ln>
-            <a:noFill/>
-          </a:ln>
-        </p:spPr>
-        <p:txBody>
-          <a:bodyPr anchorCtr="0" anchor="t" bIns="91425" lIns="91425" spcFirstLastPara="1" rIns="91425" wrap="square" tIns="91425">
-            <a:spAutoFit/>
-          </a:bodyPr>
-          <a:lstStyle/>
-          <a:p>
-            <a:pPr indent="0" lvl="0" marL="0" rtl="0" algn="ctr">
-              <a:spcBef>
-                <a:spcPts val="0"/>
-              </a:spcBef>
-              <a:spcAft>
-                <a:spcPts val="0"/>
-              </a:spcAft>
-              <a:buNone/>
-            </a:pPr>
-            <a:r>
-              <a:rPr lang="es-419" sz="1800">
-                <a:latin typeface="Oswald"/>
-                <a:ea typeface="Oswald"/>
-                <a:cs typeface="Oswald"/>
-                <a:sym typeface="Oswald"/>
-              </a:rPr>
-              <a:t>BACKEND: MVC</a:t>
-            </a:r>
-            <a:endParaRPr sz="1800">
-              <a:latin typeface="Oswald"/>
-              <a:ea typeface="Oswald"/>
-              <a:cs typeface="Oswald"/>
-              <a:sym typeface="Oswald"/>
-            </a:endParaRPr>
-          </a:p>
-        </p:txBody>
-      </p:sp>
-      <p:sp>
-        <p:nvSpPr>
-          <p:cNvPr id="251" name="Google Shape;251;p30"/>
-          <p:cNvSpPr txBox="1"/>
-          <p:nvPr>
-            <p:ph idx="1" type="body"/>
-          </p:nvPr>
-        </p:nvSpPr>
-        <p:spPr>
-          <a:xfrm>
-            <a:off x="311700" y="4273200"/>
-            <a:ext cx="8497800" cy="765900"/>
-          </a:xfrm>
-          <a:prstGeom prst="rect">
-            <a:avLst/>
-          </a:prstGeom>
-        </p:spPr>
-        <p:txBody>
-          <a:bodyPr anchorCtr="0" anchor="t" bIns="91425" lIns="91425" spcFirstLastPara="1" rIns="91425" wrap="square" tIns="91425">
-            <a:normAutofit fontScale="77500" lnSpcReduction="10000"/>
-          </a:bodyPr>
-          <a:lstStyle/>
-          <a:p>
-            <a:pPr indent="0" lvl="0" marL="0" rtl="0" algn="ctr">
-              <a:spcBef>
-                <a:spcPts val="0"/>
-              </a:spcBef>
-              <a:spcAft>
-                <a:spcPts val="1200"/>
-              </a:spcAft>
-              <a:buNone/>
-            </a:pPr>
-            <a:r>
-              <a:rPr b="1" lang="es-419" sz="2400">
-                <a:latin typeface="Open Sans"/>
-                <a:ea typeface="Open Sans"/>
-                <a:cs typeface="Open Sans"/>
-                <a:sym typeface="Open Sans"/>
-              </a:rPr>
-              <a:t>Caso</a:t>
-            </a:r>
-            <a:r>
-              <a:rPr b="1" lang="es-419" sz="2400">
-                <a:latin typeface="Open Sans"/>
-                <a:ea typeface="Open Sans"/>
-                <a:cs typeface="Open Sans"/>
-                <a:sym typeface="Open Sans"/>
-              </a:rPr>
-              <a:t> </a:t>
-            </a:r>
-            <a:r>
-              <a:rPr b="1" lang="es-419" sz="2400">
-                <a:solidFill>
-                  <a:srgbClr val="1155CC"/>
-                </a:solidFill>
-                <a:latin typeface="Open Sans"/>
-                <a:ea typeface="Open Sans"/>
-                <a:cs typeface="Open Sans"/>
-                <a:sym typeface="Open Sans"/>
-              </a:rPr>
-              <a:t>página dinámica MVC</a:t>
-            </a:r>
-            <a:r>
-              <a:rPr b="1" lang="es-419" sz="2400">
-                <a:latin typeface="Open Sans"/>
-                <a:ea typeface="Open Sans"/>
-                <a:cs typeface="Open Sans"/>
-                <a:sym typeface="Open Sans"/>
-              </a:rPr>
-              <a:t>:</a:t>
-            </a:r>
-            <a:r>
-              <a:rPr b="1" lang="es-419" sz="2400">
-                <a:latin typeface="Open Sans"/>
-                <a:ea typeface="Open Sans"/>
-                <a:cs typeface="Open Sans"/>
-                <a:sym typeface="Open Sans"/>
-              </a:rPr>
-              <a:t> el navegador muestra HTML generado al vuelo por un servicio</a:t>
-            </a:r>
-            <a:endParaRPr b="1" sz="2400">
-              <a:latin typeface="Open Sans"/>
-              <a:ea typeface="Open Sans"/>
-              <a:cs typeface="Open Sans"/>
-              <a:sym typeface="Open Sans"/>
-            </a:endParaRPr>
-          </a:p>
-        </p:txBody>
-      </p:sp>
-    </p:spTree>
-  </p:cSld>
-  <p:clrMapOvr>
-    <a:masterClrMapping/>
-  </p:clrMapOvr>
-</p:sld>
-</file>
-
-<file path=ppt/slides/slide19.xml><?xml version="1.0" encoding="utf-8"?>
-<p:sld xmlns:a="http://schemas.openxmlformats.org/drawingml/2006/main" xmlns:r="http://schemas.openxmlformats.org/officeDocument/2006/relationships" xmlns:mc="http://schemas.openxmlformats.org/markup-compatibility/2006" xmlns:mv="urn:schemas-microsoft-com:mac:vml" xmlns:p="http://schemas.openxmlformats.org/presentationml/2006/main" xmlns:c="http://schemas.openxmlformats.org/drawingml/2006/chart" xmlns:dgm="http://schemas.openxmlformats.org/drawingml/2006/diagram" xmlns:o="urn:schemas-microsoft-com:office:office" xmlns:v="urn:schemas-microsoft-com:vml" xmlns:pvml="urn:schemas-microsoft-com:office:powerpoint" xmlns:com="http://schemas.openxmlformats.org/drawingml/2006/compatibility" xmlns:p14="http://schemas.microsoft.com/office/powerpoint/2010/main" xmlns:p15="http://schemas.microsoft.com/office/powerpoint/2012/main" xmlns:ahyp="http://schemas.microsoft.com/office/drawing/2018/hyperlinkcolor">
-  <p:cSld>
-    <p:spTree>
-      <p:nvGrpSpPr>
-        <p:cNvPr id="255" name="Shape 255"/>
-        <p:cNvGrpSpPr/>
-        <p:nvPr/>
-      </p:nvGrpSpPr>
-      <p:grpSpPr>
-        <a:xfrm>
-          <a:off x="0" y="0"/>
-          <a:ext cx="0" cy="0"/>
-          <a:chOff x="0" y="0"/>
-          <a:chExt cx="0" cy="0"/>
-        </a:xfrm>
-      </p:grpSpPr>
-      <p:sp>
-        <p:nvSpPr>
-          <p:cNvPr id="256" name="Google Shape;256;p31"/>
-          <p:cNvSpPr/>
-          <p:nvPr/>
-        </p:nvSpPr>
-        <p:spPr>
-          <a:xfrm>
-            <a:off x="3703350" y="2938175"/>
-            <a:ext cx="1714500" cy="1125600"/>
-          </a:xfrm>
-          <a:prstGeom prst="roundRect">
-            <a:avLst>
-              <a:gd fmla="val 16667" name="adj"/>
-            </a:avLst>
-          </a:prstGeom>
-          <a:solidFill>
-            <a:schemeClr val="lt2"/>
-          </a:solidFill>
-          <a:ln cap="flat" cmpd="sng" w="9525">
-            <a:solidFill>
-              <a:schemeClr val="dk2"/>
-            </a:solidFill>
-            <a:prstDash val="solid"/>
-            <a:round/>
-            <a:headEnd len="sm" w="sm" type="none"/>
-            <a:tailEnd len="sm" w="sm" type="none"/>
-          </a:ln>
-        </p:spPr>
-        <p:txBody>
-          <a:bodyPr anchorCtr="0" anchor="ctr" bIns="91425" lIns="91425" spcFirstLastPara="1" rIns="91425" wrap="square" tIns="91425">
-            <a:noAutofit/>
-          </a:bodyPr>
-          <a:lstStyle/>
-          <a:p>
-            <a:pPr indent="0" lvl="0" marL="0" rtl="0" algn="l">
-              <a:spcBef>
-                <a:spcPts val="0"/>
-              </a:spcBef>
-              <a:spcAft>
-                <a:spcPts val="0"/>
-              </a:spcAft>
-              <a:buNone/>
-            </a:pPr>
-            <a:r>
-              <a:t/>
-            </a:r>
-            <a:endParaRPr/>
-          </a:p>
-        </p:txBody>
-      </p:sp>
-      <p:sp>
-        <p:nvSpPr>
-          <p:cNvPr id="257" name="Google Shape;257;p31"/>
-          <p:cNvSpPr/>
-          <p:nvPr/>
-        </p:nvSpPr>
-        <p:spPr>
-          <a:xfrm>
-            <a:off x="7721950" y="1060100"/>
-            <a:ext cx="863784" cy="628236"/>
-          </a:xfrm>
-          <a:prstGeom prst="flowChartMultidocument">
-            <a:avLst/>
-          </a:prstGeom>
-          <a:solidFill>
-            <a:srgbClr val="F6B26B"/>
-          </a:solidFill>
-          <a:ln cap="flat" cmpd="sng" w="9525">
-            <a:solidFill>
-              <a:schemeClr val="dk2"/>
-            </a:solidFill>
-            <a:prstDash val="solid"/>
-            <a:round/>
-            <a:headEnd len="sm" w="sm" type="none"/>
-            <a:tailEnd len="sm" w="sm" type="none"/>
-          </a:ln>
-        </p:spPr>
-        <p:txBody>
-          <a:bodyPr anchorCtr="0" anchor="ctr" bIns="91425" lIns="91425" spcFirstLastPara="1" rIns="91425" wrap="square" tIns="91425">
-            <a:noAutofit/>
-          </a:bodyPr>
-          <a:lstStyle/>
-          <a:p>
-            <a:pPr indent="0" lvl="0" marL="0" rtl="0" algn="l">
-              <a:spcBef>
-                <a:spcPts val="0"/>
-              </a:spcBef>
-              <a:spcAft>
-                <a:spcPts val="0"/>
-              </a:spcAft>
-              <a:buNone/>
-            </a:pPr>
-            <a:r>
-              <a:t/>
-            </a:r>
-            <a:endParaRPr/>
-          </a:p>
-        </p:txBody>
-      </p:sp>
-      <p:sp>
-        <p:nvSpPr>
-          <p:cNvPr id="258" name="Google Shape;258;p31"/>
-          <p:cNvSpPr/>
-          <p:nvPr/>
-        </p:nvSpPr>
-        <p:spPr>
-          <a:xfrm>
-            <a:off x="6151400" y="991263"/>
-            <a:ext cx="1204200" cy="765900"/>
-          </a:xfrm>
-          <a:prstGeom prst="rect">
-            <a:avLst/>
-          </a:prstGeom>
-          <a:solidFill>
-            <a:srgbClr val="F6B26B"/>
-          </a:solidFill>
-          <a:ln cap="flat" cmpd="sng" w="9525">
-            <a:solidFill>
-              <a:schemeClr val="dk2"/>
-            </a:solidFill>
-            <a:prstDash val="solid"/>
-            <a:round/>
-            <a:headEnd len="sm" w="sm" type="none"/>
-            <a:tailEnd len="sm" w="sm" type="none"/>
-          </a:ln>
-        </p:spPr>
-        <p:txBody>
-          <a:bodyPr anchorCtr="0" anchor="ctr" bIns="91425" lIns="91425" spcFirstLastPara="1" rIns="91425" wrap="square" tIns="91425">
-            <a:noAutofit/>
-          </a:bodyPr>
-          <a:lstStyle/>
-          <a:p>
-            <a:pPr indent="0" lvl="0" marL="0" rtl="0" algn="ctr">
-              <a:spcBef>
-                <a:spcPts val="0"/>
-              </a:spcBef>
-              <a:spcAft>
-                <a:spcPts val="0"/>
-              </a:spcAft>
-              <a:buNone/>
-            </a:pPr>
-            <a:r>
-              <a:rPr lang="es-419">
-                <a:latin typeface="Oswald"/>
-                <a:ea typeface="Oswald"/>
-                <a:cs typeface="Oswald"/>
-                <a:sym typeface="Oswald"/>
-              </a:rPr>
-              <a:t>SERVICIO</a:t>
-            </a:r>
-            <a:endParaRPr>
-              <a:latin typeface="Oswald"/>
-              <a:ea typeface="Oswald"/>
-              <a:cs typeface="Oswald"/>
-              <a:sym typeface="Oswald"/>
-            </a:endParaRPr>
-          </a:p>
-        </p:txBody>
-      </p:sp>
-      <p:sp>
-        <p:nvSpPr>
-          <p:cNvPr id="259" name="Google Shape;259;p31"/>
-          <p:cNvSpPr/>
-          <p:nvPr/>
-        </p:nvSpPr>
-        <p:spPr>
-          <a:xfrm>
-            <a:off x="4921275" y="991275"/>
-            <a:ext cx="863700" cy="765900"/>
-          </a:xfrm>
-          <a:prstGeom prst="ellipse">
-            <a:avLst/>
-          </a:prstGeom>
-          <a:solidFill>
-            <a:srgbClr val="F9CB9C"/>
-          </a:solidFill>
-          <a:ln cap="flat" cmpd="sng" w="9525">
-            <a:solidFill>
-              <a:schemeClr val="dk2"/>
-            </a:solidFill>
-            <a:prstDash val="solid"/>
-            <a:round/>
-            <a:headEnd len="sm" w="sm" type="none"/>
-            <a:tailEnd len="sm" w="sm" type="none"/>
-          </a:ln>
-        </p:spPr>
-        <p:txBody>
-          <a:bodyPr anchorCtr="0" anchor="ctr" bIns="91425" lIns="91425" spcFirstLastPara="1" rIns="91425" wrap="square" tIns="91425">
-            <a:noAutofit/>
-          </a:bodyPr>
-          <a:lstStyle/>
-          <a:p>
-            <a:pPr indent="0" lvl="0" marL="0" rtl="0" algn="ctr">
-              <a:spcBef>
-                <a:spcPts val="0"/>
-              </a:spcBef>
-              <a:spcAft>
-                <a:spcPts val="0"/>
-              </a:spcAft>
-              <a:buNone/>
-            </a:pPr>
-            <a:r>
-              <a:rPr lang="es-419">
-                <a:latin typeface="Oswald"/>
-                <a:ea typeface="Oswald"/>
-                <a:cs typeface="Oswald"/>
-                <a:sym typeface="Oswald"/>
-              </a:rPr>
-              <a:t>JSON</a:t>
-            </a:r>
-            <a:endParaRPr>
-              <a:latin typeface="Oswald"/>
-              <a:ea typeface="Oswald"/>
-              <a:cs typeface="Oswald"/>
-              <a:sym typeface="Oswald"/>
-            </a:endParaRPr>
-          </a:p>
-        </p:txBody>
-      </p:sp>
-      <p:sp>
-        <p:nvSpPr>
-          <p:cNvPr id="260" name="Google Shape;260;p31"/>
+          <p:cNvPr id="233" name="Google Shape;233;p30"/>
           <p:cNvSpPr/>
           <p:nvPr/>
         </p:nvSpPr>
@@ -11099,7 +10024,7 @@
       </p:sp>
       <p:sp>
         <p:nvSpPr>
-          <p:cNvPr id="261" name="Google Shape;261;p31"/>
+          <p:cNvPr id="234" name="Google Shape;234;p30"/>
           <p:cNvSpPr/>
           <p:nvPr/>
         </p:nvSpPr>
@@ -11161,7 +10086,7 @@
       </p:sp>
       <p:sp>
         <p:nvSpPr>
-          <p:cNvPr id="262" name="Google Shape;262;p31"/>
+          <p:cNvPr id="235" name="Google Shape;235;p30"/>
           <p:cNvSpPr/>
           <p:nvPr/>
         </p:nvSpPr>
@@ -11221,17 +10146,17 @@
       </p:sp>
       <p:cxnSp>
         <p:nvCxnSpPr>
-          <p:cNvPr id="263" name="Google Shape;263;p31"/>
+          <p:cNvPr id="236" name="Google Shape;236;p30"/>
           <p:cNvCxnSpPr>
-            <a:stCxn id="257" idx="1"/>
-            <a:endCxn id="258" idx="3"/>
+            <a:stCxn id="233" idx="3"/>
+            <a:endCxn id="234" idx="1"/>
           </p:cNvCxnSpPr>
           <p:nvPr/>
         </p:nvCxnSpPr>
         <p:spPr>
-          <a:xfrm rot="10800000">
-            <a:off x="7355650" y="1374218"/>
-            <a:ext cx="366300" cy="0"/>
+          <a:xfrm>
+            <a:off x="1422059" y="1374231"/>
+            <a:ext cx="291000" cy="0"/>
           </a:xfrm>
           <a:prstGeom prst="straightConnector1">
             <a:avLst/>
@@ -11250,17 +10175,17 @@
       </p:cxnSp>
       <p:cxnSp>
         <p:nvCxnSpPr>
-          <p:cNvPr id="264" name="Google Shape;264;p31"/>
+          <p:cNvPr id="237" name="Google Shape;237;p30"/>
           <p:cNvCxnSpPr>
-            <a:stCxn id="258" idx="1"/>
-            <a:endCxn id="259" idx="6"/>
+            <a:stCxn id="234" idx="3"/>
+            <a:endCxn id="238" idx="2"/>
           </p:cNvCxnSpPr>
           <p:nvPr/>
         </p:nvCxnSpPr>
         <p:spPr>
-          <a:xfrm rot="10800000">
-            <a:off x="5785100" y="1374213"/>
-            <a:ext cx="366300" cy="0"/>
+          <a:xfrm>
+            <a:off x="2917317" y="1374225"/>
+            <a:ext cx="291000" cy="0"/>
           </a:xfrm>
           <a:prstGeom prst="straightConnector1">
             <a:avLst/>
@@ -11277,140 +10202,16 @@
           </a:ln>
         </p:spPr>
       </p:cxnSp>
-      <p:cxnSp>
-        <p:nvCxnSpPr>
-          <p:cNvPr id="265" name="Google Shape;265;p31"/>
-          <p:cNvCxnSpPr>
-            <a:stCxn id="260" idx="3"/>
-            <a:endCxn id="261" idx="1"/>
-          </p:cNvCxnSpPr>
-          <p:nvPr/>
-        </p:nvCxnSpPr>
-        <p:spPr>
-          <a:xfrm>
-            <a:off x="1422059" y="1374231"/>
-            <a:ext cx="291000" cy="0"/>
-          </a:xfrm>
-          <a:prstGeom prst="straightConnector1">
-            <a:avLst/>
-          </a:prstGeom>
-          <a:noFill/>
-          <a:ln cap="flat" cmpd="sng" w="19050">
-            <a:solidFill>
-              <a:schemeClr val="dk2"/>
-            </a:solidFill>
-            <a:prstDash val="solid"/>
-            <a:round/>
-            <a:headEnd len="med" w="med" type="none"/>
-            <a:tailEnd len="med" w="med" type="triangle"/>
-          </a:ln>
-        </p:spPr>
-      </p:cxnSp>
-      <p:cxnSp>
-        <p:nvCxnSpPr>
-          <p:cNvPr id="266" name="Google Shape;266;p31"/>
-          <p:cNvCxnSpPr>
-            <a:stCxn id="261" idx="3"/>
-            <a:endCxn id="267" idx="2"/>
-          </p:cNvCxnSpPr>
-          <p:nvPr/>
-        </p:nvCxnSpPr>
-        <p:spPr>
-          <a:xfrm>
-            <a:off x="2917317" y="1374225"/>
-            <a:ext cx="291000" cy="0"/>
-          </a:xfrm>
-          <a:prstGeom prst="straightConnector1">
-            <a:avLst/>
-          </a:prstGeom>
-          <a:noFill/>
-          <a:ln cap="flat" cmpd="sng" w="19050">
-            <a:solidFill>
-              <a:schemeClr val="dk2"/>
-            </a:solidFill>
-            <a:prstDash val="solid"/>
-            <a:round/>
-            <a:headEnd len="med" w="med" type="none"/>
-            <a:tailEnd len="med" w="med" type="triangle"/>
-          </a:ln>
-        </p:spPr>
-      </p:cxnSp>
-      <p:cxnSp>
-        <p:nvCxnSpPr>
-          <p:cNvPr id="268" name="Google Shape;268;p31"/>
-          <p:cNvCxnSpPr>
-            <a:stCxn id="269" idx="3"/>
-            <a:endCxn id="262" idx="1"/>
-          </p:cNvCxnSpPr>
-          <p:nvPr/>
-        </p:nvCxnSpPr>
-        <p:spPr>
-          <a:xfrm flipH="1">
-            <a:off x="3912772" y="1374206"/>
-            <a:ext cx="122700" cy="2126700"/>
-          </a:xfrm>
-          <a:prstGeom prst="bentConnector5">
-            <a:avLst>
-              <a:gd fmla="val -194071" name="adj1"/>
-              <a:gd fmla="val 47048" name="adj2"/>
-              <a:gd fmla="val 558269" name="adj3"/>
-            </a:avLst>
-          </a:prstGeom>
-          <a:noFill/>
-          <a:ln cap="flat" cmpd="sng" w="19050">
-            <a:solidFill>
-              <a:schemeClr val="dk2"/>
-            </a:solidFill>
-            <a:prstDash val="solid"/>
-            <a:round/>
-            <a:headEnd len="med" w="med" type="none"/>
-            <a:tailEnd len="med" w="med" type="triangle"/>
-          </a:ln>
-        </p:spPr>
-      </p:cxnSp>
-      <p:cxnSp>
-        <p:nvCxnSpPr>
-          <p:cNvPr id="270" name="Google Shape;270;p31"/>
-          <p:cNvCxnSpPr>
-            <a:stCxn id="259" idx="2"/>
-            <a:endCxn id="262" idx="3"/>
-          </p:cNvCxnSpPr>
-          <p:nvPr/>
-        </p:nvCxnSpPr>
-        <p:spPr>
-          <a:xfrm>
-            <a:off x="4921275" y="1374225"/>
-            <a:ext cx="287100" cy="2126700"/>
-          </a:xfrm>
-          <a:prstGeom prst="bentConnector5">
-            <a:avLst>
-              <a:gd fmla="val -82941" name="adj1"/>
-              <a:gd fmla="val 48696" name="adj2"/>
-              <a:gd fmla="val 328126" name="adj3"/>
-            </a:avLst>
-          </a:prstGeom>
-          <a:noFill/>
-          <a:ln cap="flat" cmpd="sng" w="19050">
-            <a:solidFill>
-              <a:schemeClr val="dk2"/>
-            </a:solidFill>
-            <a:prstDash val="solid"/>
-            <a:round/>
-            <a:headEnd len="med" w="med" type="none"/>
-            <a:tailEnd len="med" w="med" type="triangle"/>
-          </a:ln>
-        </p:spPr>
-      </p:cxnSp>
       <p:sp>
         <p:nvSpPr>
-          <p:cNvPr id="271" name="Google Shape;271;p31"/>
+          <p:cNvPr id="239" name="Google Shape;239;p30"/>
           <p:cNvSpPr txBox="1"/>
           <p:nvPr/>
         </p:nvSpPr>
         <p:spPr>
           <a:xfrm>
-            <a:off x="4683150" y="366450"/>
-            <a:ext cx="3902700" cy="461700"/>
+            <a:off x="558275" y="366450"/>
+            <a:ext cx="3751800" cy="461700"/>
           </a:xfrm>
           <a:prstGeom prst="rect">
             <a:avLst/>
@@ -11442,7 +10243,7 @@
                 <a:cs typeface="Oswald"/>
                 <a:sym typeface="Oswald"/>
               </a:rPr>
-              <a:t>BACKEND: API REST</a:t>
+              <a:t>FRONTEND</a:t>
             </a:r>
             <a:endParaRPr sz="1800">
               <a:latin typeface="Oswald"/>
@@ -11455,59 +10256,7 @@
       </p:sp>
       <p:sp>
         <p:nvSpPr>
-          <p:cNvPr id="272" name="Google Shape;272;p31"/>
-          <p:cNvSpPr txBox="1"/>
-          <p:nvPr/>
-        </p:nvSpPr>
-        <p:spPr>
-          <a:xfrm>
-            <a:off x="558275" y="366450"/>
-            <a:ext cx="3751800" cy="461700"/>
-          </a:xfrm>
-          <a:prstGeom prst="rect">
-            <a:avLst/>
-          </a:prstGeom>
-          <a:noFill/>
-          <a:ln>
-            <a:noFill/>
-          </a:ln>
-        </p:spPr>
-        <p:txBody>
-          <a:bodyPr anchorCtr="0" anchor="t" bIns="91425" lIns="91425" spcFirstLastPara="1" rIns="91425" wrap="square" tIns="91425">
-            <a:spAutoFit/>
-          </a:bodyPr>
-          <a:lstStyle/>
-          <a:p>
-            <a:pPr indent="0" lvl="0" marL="0" rtl="0" algn="ctr">
-              <a:spcBef>
-                <a:spcPts val="0"/>
-              </a:spcBef>
-              <a:spcAft>
-                <a:spcPts val="0"/>
-              </a:spcAft>
-              <a:buNone/>
-            </a:pPr>
-            <a:r>
-              <a:rPr lang="es-419" sz="1800">
-                <a:latin typeface="Oswald"/>
-                <a:ea typeface="Oswald"/>
-                <a:cs typeface="Oswald"/>
-                <a:sym typeface="Oswald"/>
-              </a:rPr>
-              <a:t>FRONTEND: SPA</a:t>
-            </a:r>
-            <a:endParaRPr sz="1800">
-              <a:latin typeface="Oswald"/>
-              <a:ea typeface="Oswald"/>
-              <a:cs typeface="Oswald"/>
-              <a:sym typeface="Oswald"/>
-            </a:endParaRPr>
-          </a:p>
-        </p:txBody>
-      </p:sp>
-      <p:sp>
-        <p:nvSpPr>
-          <p:cNvPr id="273" name="Google Shape;273;p31"/>
+          <p:cNvPr id="240" name="Google Shape;240;p30"/>
           <p:cNvSpPr txBox="1"/>
           <p:nvPr>
             <p:ph idx="1" type="body"/>
@@ -11544,16 +10293,7 @@
                 <a:cs typeface="Open Sans"/>
                 <a:sym typeface="Open Sans"/>
               </a:rPr>
-              <a:t>Caso</a:t>
-            </a:r>
-            <a:r>
-              <a:rPr b="1" lang="es-419" sz="2400">
-                <a:latin typeface="Open Sans"/>
-                <a:ea typeface="Open Sans"/>
-                <a:cs typeface="Open Sans"/>
-                <a:sym typeface="Open Sans"/>
-              </a:rPr>
-              <a:t> </a:t>
+              <a:t>Caso </a:t>
             </a:r>
             <a:r>
               <a:rPr b="1" lang="es-419" sz="2400">
@@ -11565,7 +10305,7 @@
                 <a:cs typeface="Open Sans"/>
                 <a:sym typeface="Open Sans"/>
               </a:rPr>
-              <a:t>SPA - API REST</a:t>
+              <a:t>página estática</a:t>
             </a:r>
             <a:r>
               <a:rPr b="1" lang="es-419" sz="2400">
@@ -11574,16 +10314,7 @@
                 <a:cs typeface="Open Sans"/>
                 <a:sym typeface="Open Sans"/>
               </a:rPr>
-              <a:t>:</a:t>
-            </a:r>
-            <a:r>
-              <a:rPr b="1" lang="es-419" sz="2400">
-                <a:latin typeface="Open Sans"/>
-                <a:ea typeface="Open Sans"/>
-                <a:cs typeface="Open Sans"/>
-                <a:sym typeface="Open Sans"/>
-              </a:rPr>
-              <a:t> el navegador muestra HTML proveniente del frontend, que consume data proveniente del backend</a:t>
+              <a:t>: el navegador muestra HTML proveniente de archivos HTML </a:t>
             </a:r>
             <a:endParaRPr b="1" sz="2400">
               <a:latin typeface="Open Sans"/>
@@ -11596,7 +10327,7 @@
       </p:sp>
       <p:sp>
         <p:nvSpPr>
-          <p:cNvPr id="269" name="Google Shape;269;p31"/>
+          <p:cNvPr id="241" name="Google Shape;241;p30"/>
           <p:cNvSpPr/>
           <p:nvPr/>
         </p:nvSpPr>
@@ -11656,6 +10387,558 @@
           </a:p>
         </p:txBody>
       </p:sp>
+      <p:cxnSp>
+        <p:nvCxnSpPr>
+          <p:cNvPr id="242" name="Google Shape;242;p30"/>
+          <p:cNvCxnSpPr>
+            <a:stCxn id="241" idx="3"/>
+            <a:endCxn id="235" idx="1"/>
+          </p:cNvCxnSpPr>
+          <p:nvPr/>
+        </p:nvCxnSpPr>
+        <p:spPr>
+          <a:xfrm flipH="1">
+            <a:off x="3912772" y="1374206"/>
+            <a:ext cx="122700" cy="2126700"/>
+          </a:xfrm>
+          <a:prstGeom prst="curvedConnector5">
+            <a:avLst>
+              <a:gd fmla="val -194071" name="adj1"/>
+              <a:gd fmla="val 47048" name="adj2"/>
+              <a:gd fmla="val 294088" name="adj3"/>
+            </a:avLst>
+          </a:prstGeom>
+          <a:noFill/>
+          <a:ln cap="flat" cmpd="sng" w="28575">
+            <a:solidFill>
+              <a:schemeClr val="dk2"/>
+            </a:solidFill>
+            <a:prstDash val="solid"/>
+            <a:round/>
+            <a:headEnd len="med" w="med" type="none"/>
+            <a:tailEnd len="med" w="med" type="triangle"/>
+          </a:ln>
+        </p:spPr>
+      </p:cxnSp>
+    </p:spTree>
+  </p:cSld>
+  <p:clrMapOvr>
+    <a:masterClrMapping/>
+  </p:clrMapOvr>
+</p:sld>
+</file>
+
+<file path=ppt/slides/slide19.xml><?xml version="1.0" encoding="utf-8"?>
+<p:sld xmlns:a="http://schemas.openxmlformats.org/drawingml/2006/main" xmlns:r="http://schemas.openxmlformats.org/officeDocument/2006/relationships" xmlns:mc="http://schemas.openxmlformats.org/markup-compatibility/2006" xmlns:mv="urn:schemas-microsoft-com:mac:vml" xmlns:p="http://schemas.openxmlformats.org/presentationml/2006/main" xmlns:c="http://schemas.openxmlformats.org/drawingml/2006/chart" xmlns:dgm="http://schemas.openxmlformats.org/drawingml/2006/diagram" xmlns:o="urn:schemas-microsoft-com:office:office" xmlns:v="urn:schemas-microsoft-com:vml" xmlns:pvml="urn:schemas-microsoft-com:office:powerpoint" xmlns:com="http://schemas.openxmlformats.org/drawingml/2006/compatibility" xmlns:p14="http://schemas.microsoft.com/office/powerpoint/2010/main" xmlns:p15="http://schemas.microsoft.com/office/powerpoint/2012/main" xmlns:ahyp="http://schemas.microsoft.com/office/drawing/2018/hyperlinkcolor">
+  <p:cSld>
+    <p:spTree>
+      <p:nvGrpSpPr>
+        <p:cNvPr id="246" name="Shape 246"/>
+        <p:cNvGrpSpPr/>
+        <p:nvPr/>
+      </p:nvGrpSpPr>
+      <p:grpSpPr>
+        <a:xfrm>
+          <a:off x="0" y="0"/>
+          <a:ext cx="0" cy="0"/>
+          <a:chOff x="0" y="0"/>
+          <a:chExt cx="0" cy="0"/>
+        </a:xfrm>
+      </p:grpSpPr>
+      <p:sp>
+        <p:nvSpPr>
+          <p:cNvPr id="247" name="Google Shape;247;p31"/>
+          <p:cNvSpPr/>
+          <p:nvPr/>
+        </p:nvSpPr>
+        <p:spPr>
+          <a:xfrm>
+            <a:off x="3703350" y="2938175"/>
+            <a:ext cx="1714500" cy="1125600"/>
+          </a:xfrm>
+          <a:prstGeom prst="roundRect">
+            <a:avLst>
+              <a:gd fmla="val 16667" name="adj"/>
+            </a:avLst>
+          </a:prstGeom>
+          <a:solidFill>
+            <a:schemeClr val="lt2"/>
+          </a:solidFill>
+          <a:ln cap="flat" cmpd="sng" w="9525">
+            <a:solidFill>
+              <a:schemeClr val="dk2"/>
+            </a:solidFill>
+            <a:prstDash val="solid"/>
+            <a:round/>
+            <a:headEnd len="sm" w="sm" type="none"/>
+            <a:tailEnd len="sm" w="sm" type="none"/>
+          </a:ln>
+        </p:spPr>
+        <p:txBody>
+          <a:bodyPr anchorCtr="0" anchor="ctr" bIns="91425" lIns="91425" spcFirstLastPara="1" rIns="91425" wrap="square" tIns="91425">
+            <a:noAutofit/>
+          </a:bodyPr>
+          <a:lstStyle/>
+          <a:p>
+            <a:pPr indent="0" lvl="0" marL="0" rtl="0" algn="l">
+              <a:spcBef>
+                <a:spcPts val="0"/>
+              </a:spcBef>
+              <a:spcAft>
+                <a:spcPts val="0"/>
+              </a:spcAft>
+              <a:buNone/>
+            </a:pPr>
+            <a:r>
+              <a:t/>
+            </a:r>
+            <a:endParaRPr/>
+          </a:p>
+        </p:txBody>
+      </p:sp>
+      <p:sp>
+        <p:nvSpPr>
+          <p:cNvPr id="248" name="Google Shape;248;p31"/>
+          <p:cNvSpPr/>
+          <p:nvPr/>
+        </p:nvSpPr>
+        <p:spPr>
+          <a:xfrm>
+            <a:off x="7721950" y="1060100"/>
+            <a:ext cx="863784" cy="628236"/>
+          </a:xfrm>
+          <a:prstGeom prst="flowChartMultidocument">
+            <a:avLst/>
+          </a:prstGeom>
+          <a:solidFill>
+            <a:srgbClr val="F6B26B"/>
+          </a:solidFill>
+          <a:ln cap="flat" cmpd="sng" w="9525">
+            <a:solidFill>
+              <a:schemeClr val="dk2"/>
+            </a:solidFill>
+            <a:prstDash val="solid"/>
+            <a:round/>
+            <a:headEnd len="sm" w="sm" type="none"/>
+            <a:tailEnd len="sm" w="sm" type="none"/>
+          </a:ln>
+        </p:spPr>
+        <p:txBody>
+          <a:bodyPr anchorCtr="0" anchor="ctr" bIns="91425" lIns="91425" spcFirstLastPara="1" rIns="91425" wrap="square" tIns="91425">
+            <a:noAutofit/>
+          </a:bodyPr>
+          <a:lstStyle/>
+          <a:p>
+            <a:pPr indent="0" lvl="0" marL="0" rtl="0" algn="l">
+              <a:spcBef>
+                <a:spcPts val="0"/>
+              </a:spcBef>
+              <a:spcAft>
+                <a:spcPts val="0"/>
+              </a:spcAft>
+              <a:buNone/>
+            </a:pPr>
+            <a:r>
+              <a:t/>
+            </a:r>
+            <a:endParaRPr/>
+          </a:p>
+        </p:txBody>
+      </p:sp>
+      <p:sp>
+        <p:nvSpPr>
+          <p:cNvPr id="249" name="Google Shape;249;p31"/>
+          <p:cNvSpPr/>
+          <p:nvPr/>
+        </p:nvSpPr>
+        <p:spPr>
+          <a:xfrm>
+            <a:off x="6151400" y="991263"/>
+            <a:ext cx="1204200" cy="765900"/>
+          </a:xfrm>
+          <a:prstGeom prst="rect">
+            <a:avLst/>
+          </a:prstGeom>
+          <a:solidFill>
+            <a:srgbClr val="F6B26B"/>
+          </a:solidFill>
+          <a:ln cap="flat" cmpd="sng" w="9525">
+            <a:solidFill>
+              <a:schemeClr val="dk2"/>
+            </a:solidFill>
+            <a:prstDash val="solid"/>
+            <a:round/>
+            <a:headEnd len="sm" w="sm" type="none"/>
+            <a:tailEnd len="sm" w="sm" type="none"/>
+          </a:ln>
+        </p:spPr>
+        <p:txBody>
+          <a:bodyPr anchorCtr="0" anchor="ctr" bIns="91425" lIns="91425" spcFirstLastPara="1" rIns="91425" wrap="square" tIns="91425">
+            <a:noAutofit/>
+          </a:bodyPr>
+          <a:lstStyle/>
+          <a:p>
+            <a:pPr indent="0" lvl="0" marL="0" rtl="0" algn="ctr">
+              <a:spcBef>
+                <a:spcPts val="0"/>
+              </a:spcBef>
+              <a:spcAft>
+                <a:spcPts val="0"/>
+              </a:spcAft>
+              <a:buNone/>
+            </a:pPr>
+            <a:r>
+              <a:rPr lang="es-419">
+                <a:latin typeface="Oswald"/>
+                <a:ea typeface="Oswald"/>
+                <a:cs typeface="Oswald"/>
+                <a:sym typeface="Oswald"/>
+              </a:rPr>
+              <a:t>SERVICIO</a:t>
+            </a:r>
+            <a:endParaRPr>
+              <a:latin typeface="Oswald"/>
+              <a:ea typeface="Oswald"/>
+              <a:cs typeface="Oswald"/>
+              <a:sym typeface="Oswald"/>
+            </a:endParaRPr>
+          </a:p>
+        </p:txBody>
+      </p:sp>
+      <p:sp>
+        <p:nvSpPr>
+          <p:cNvPr id="250" name="Google Shape;250;p31"/>
+          <p:cNvSpPr/>
+          <p:nvPr/>
+        </p:nvSpPr>
+        <p:spPr>
+          <a:xfrm>
+            <a:off x="4921275" y="991275"/>
+            <a:ext cx="863700" cy="765900"/>
+          </a:xfrm>
+          <a:prstGeom prst="ellipse">
+            <a:avLst/>
+          </a:prstGeom>
+          <a:solidFill>
+            <a:srgbClr val="F6B26B"/>
+          </a:solidFill>
+          <a:ln cap="flat" cmpd="sng" w="9525">
+            <a:solidFill>
+              <a:schemeClr val="dk2"/>
+            </a:solidFill>
+            <a:prstDash val="solid"/>
+            <a:round/>
+            <a:headEnd len="sm" w="sm" type="none"/>
+            <a:tailEnd len="sm" w="sm" type="none"/>
+          </a:ln>
+        </p:spPr>
+        <p:txBody>
+          <a:bodyPr anchorCtr="0" anchor="ctr" bIns="91425" lIns="91425" spcFirstLastPara="1" rIns="91425" wrap="square" tIns="91425">
+            <a:noAutofit/>
+          </a:bodyPr>
+          <a:lstStyle/>
+          <a:p>
+            <a:pPr indent="0" lvl="0" marL="0" rtl="0" algn="ctr">
+              <a:spcBef>
+                <a:spcPts val="0"/>
+              </a:spcBef>
+              <a:spcAft>
+                <a:spcPts val="0"/>
+              </a:spcAft>
+              <a:buNone/>
+            </a:pPr>
+            <a:r>
+              <a:rPr lang="es-419">
+                <a:latin typeface="Oswald"/>
+                <a:ea typeface="Oswald"/>
+                <a:cs typeface="Oswald"/>
+                <a:sym typeface="Oswald"/>
+              </a:rPr>
+              <a:t>HTML</a:t>
+            </a:r>
+            <a:endParaRPr>
+              <a:latin typeface="Oswald"/>
+              <a:ea typeface="Oswald"/>
+              <a:cs typeface="Oswald"/>
+              <a:sym typeface="Oswald"/>
+            </a:endParaRPr>
+          </a:p>
+        </p:txBody>
+      </p:sp>
+      <p:sp>
+        <p:nvSpPr>
+          <p:cNvPr id="251" name="Google Shape;251;p31"/>
+          <p:cNvSpPr/>
+          <p:nvPr/>
+        </p:nvSpPr>
+        <p:spPr>
+          <a:xfrm>
+            <a:off x="3912750" y="3062525"/>
+            <a:ext cx="1295700" cy="876900"/>
+          </a:xfrm>
+          <a:prstGeom prst="rect">
+            <a:avLst/>
+          </a:prstGeom>
+          <a:solidFill>
+            <a:srgbClr val="CFE2F3"/>
+          </a:solidFill>
+          <a:ln cap="flat" cmpd="sng" w="9525">
+            <a:solidFill>
+              <a:schemeClr val="dk2"/>
+            </a:solidFill>
+            <a:prstDash val="solid"/>
+            <a:round/>
+            <a:headEnd len="sm" w="sm" type="none"/>
+            <a:tailEnd len="sm" w="sm" type="none"/>
+          </a:ln>
+        </p:spPr>
+        <p:txBody>
+          <a:bodyPr anchorCtr="0" anchor="ctr" bIns="91425" lIns="91425" spcFirstLastPara="1" rIns="91425" wrap="square" tIns="91425">
+            <a:noAutofit/>
+          </a:bodyPr>
+          <a:lstStyle/>
+          <a:p>
+            <a:pPr indent="0" lvl="0" marL="0" rtl="0" algn="ctr">
+              <a:spcBef>
+                <a:spcPts val="0"/>
+              </a:spcBef>
+              <a:spcAft>
+                <a:spcPts val="0"/>
+              </a:spcAft>
+              <a:buNone/>
+            </a:pPr>
+            <a:r>
+              <a:rPr lang="es-419">
+                <a:latin typeface="Oswald"/>
+                <a:ea typeface="Oswald"/>
+                <a:cs typeface="Oswald"/>
+                <a:sym typeface="Oswald"/>
+              </a:rPr>
+              <a:t>NAVEGADOR</a:t>
+            </a:r>
+            <a:endParaRPr>
+              <a:latin typeface="Oswald"/>
+              <a:ea typeface="Oswald"/>
+              <a:cs typeface="Oswald"/>
+              <a:sym typeface="Oswald"/>
+            </a:endParaRPr>
+          </a:p>
+        </p:txBody>
+      </p:sp>
+      <p:cxnSp>
+        <p:nvCxnSpPr>
+          <p:cNvPr id="252" name="Google Shape;252;p31"/>
+          <p:cNvCxnSpPr>
+            <a:stCxn id="248" idx="1"/>
+            <a:endCxn id="249" idx="3"/>
+          </p:cNvCxnSpPr>
+          <p:nvPr/>
+        </p:nvCxnSpPr>
+        <p:spPr>
+          <a:xfrm rot="10800000">
+            <a:off x="7355650" y="1374218"/>
+            <a:ext cx="366300" cy="0"/>
+          </a:xfrm>
+          <a:prstGeom prst="straightConnector1">
+            <a:avLst/>
+          </a:prstGeom>
+          <a:noFill/>
+          <a:ln cap="flat" cmpd="sng" w="19050">
+            <a:solidFill>
+              <a:schemeClr val="dk2"/>
+            </a:solidFill>
+            <a:prstDash val="solid"/>
+            <a:round/>
+            <a:headEnd len="med" w="med" type="none"/>
+            <a:tailEnd len="med" w="med" type="triangle"/>
+          </a:ln>
+        </p:spPr>
+      </p:cxnSp>
+      <p:cxnSp>
+        <p:nvCxnSpPr>
+          <p:cNvPr id="253" name="Google Shape;253;p31"/>
+          <p:cNvCxnSpPr>
+            <a:stCxn id="249" idx="1"/>
+            <a:endCxn id="250" idx="6"/>
+          </p:cNvCxnSpPr>
+          <p:nvPr/>
+        </p:nvCxnSpPr>
+        <p:spPr>
+          <a:xfrm rot="10800000">
+            <a:off x="5785100" y="1374213"/>
+            <a:ext cx="366300" cy="0"/>
+          </a:xfrm>
+          <a:prstGeom prst="straightConnector1">
+            <a:avLst/>
+          </a:prstGeom>
+          <a:noFill/>
+          <a:ln cap="flat" cmpd="sng" w="19050">
+            <a:solidFill>
+              <a:schemeClr val="dk2"/>
+            </a:solidFill>
+            <a:prstDash val="solid"/>
+            <a:round/>
+            <a:headEnd len="med" w="med" type="none"/>
+            <a:tailEnd len="med" w="med" type="triangle"/>
+          </a:ln>
+        </p:spPr>
+      </p:cxnSp>
+      <p:sp>
+        <p:nvSpPr>
+          <p:cNvPr id="254" name="Google Shape;254;p31"/>
+          <p:cNvSpPr txBox="1"/>
+          <p:nvPr/>
+        </p:nvSpPr>
+        <p:spPr>
+          <a:xfrm>
+            <a:off x="4683150" y="366450"/>
+            <a:ext cx="3902700" cy="461700"/>
+          </a:xfrm>
+          <a:prstGeom prst="rect">
+            <a:avLst/>
+          </a:prstGeom>
+          <a:noFill/>
+          <a:ln>
+            <a:noFill/>
+          </a:ln>
+        </p:spPr>
+        <p:txBody>
+          <a:bodyPr anchorCtr="0" anchor="t" bIns="91425" lIns="91425" spcFirstLastPara="1" rIns="91425" wrap="square" tIns="91425">
+            <a:spAutoFit/>
+          </a:bodyPr>
+          <a:lstStyle/>
+          <a:p>
+            <a:pPr indent="0" lvl="0" marL="0" rtl="0" algn="ctr">
+              <a:spcBef>
+                <a:spcPts val="0"/>
+              </a:spcBef>
+              <a:spcAft>
+                <a:spcPts val="0"/>
+              </a:spcAft>
+              <a:buNone/>
+            </a:pPr>
+            <a:r>
+              <a:rPr lang="es-419" sz="1800">
+                <a:latin typeface="Oswald"/>
+                <a:ea typeface="Oswald"/>
+                <a:cs typeface="Oswald"/>
+                <a:sym typeface="Oswald"/>
+              </a:rPr>
+              <a:t>BACKEND: MVC</a:t>
+            </a:r>
+            <a:endParaRPr sz="1800">
+              <a:latin typeface="Oswald"/>
+              <a:ea typeface="Oswald"/>
+              <a:cs typeface="Oswald"/>
+              <a:sym typeface="Oswald"/>
+            </a:endParaRPr>
+          </a:p>
+        </p:txBody>
+      </p:sp>
+      <p:sp>
+        <p:nvSpPr>
+          <p:cNvPr id="255" name="Google Shape;255;p31"/>
+          <p:cNvSpPr txBox="1"/>
+          <p:nvPr>
+            <p:ph idx="1" type="body"/>
+          </p:nvPr>
+        </p:nvSpPr>
+        <p:spPr>
+          <a:xfrm>
+            <a:off x="311700" y="4273200"/>
+            <a:ext cx="8497800" cy="765900"/>
+          </a:xfrm>
+          <a:prstGeom prst="rect">
+            <a:avLst/>
+          </a:prstGeom>
+        </p:spPr>
+        <p:txBody>
+          <a:bodyPr anchorCtr="0" anchor="t" bIns="91425" lIns="91425" spcFirstLastPara="1" rIns="91425" wrap="square" tIns="91425">
+            <a:normAutofit fontScale="77500" lnSpcReduction="10000"/>
+          </a:bodyPr>
+          <a:lstStyle/>
+          <a:p>
+            <a:pPr indent="0" lvl="0" marL="0" rtl="0" algn="ctr">
+              <a:spcBef>
+                <a:spcPts val="0"/>
+              </a:spcBef>
+              <a:spcAft>
+                <a:spcPts val="1200"/>
+              </a:spcAft>
+              <a:buNone/>
+            </a:pPr>
+            <a:r>
+              <a:rPr b="1" lang="es-419" sz="2400">
+                <a:latin typeface="Open Sans"/>
+                <a:ea typeface="Open Sans"/>
+                <a:cs typeface="Open Sans"/>
+                <a:sym typeface="Open Sans"/>
+              </a:rPr>
+              <a:t>Caso </a:t>
+            </a:r>
+            <a:r>
+              <a:rPr b="1" lang="es-419" sz="2400">
+                <a:solidFill>
+                  <a:srgbClr val="1155CC"/>
+                </a:solidFill>
+                <a:latin typeface="Open Sans"/>
+                <a:ea typeface="Open Sans"/>
+                <a:cs typeface="Open Sans"/>
+                <a:sym typeface="Open Sans"/>
+              </a:rPr>
+              <a:t>página dinámica MVC</a:t>
+            </a:r>
+            <a:r>
+              <a:rPr b="1" lang="es-419" sz="2400">
+                <a:latin typeface="Open Sans"/>
+                <a:ea typeface="Open Sans"/>
+                <a:cs typeface="Open Sans"/>
+                <a:sym typeface="Open Sans"/>
+              </a:rPr>
+              <a:t>: el navegador muestra HTML generado al vuelo por un servicio</a:t>
+            </a:r>
+            <a:endParaRPr b="1" sz="2400">
+              <a:latin typeface="Open Sans"/>
+              <a:ea typeface="Open Sans"/>
+              <a:cs typeface="Open Sans"/>
+              <a:sym typeface="Open Sans"/>
+            </a:endParaRPr>
+          </a:p>
+        </p:txBody>
+      </p:sp>
+      <p:cxnSp>
+        <p:nvCxnSpPr>
+          <p:cNvPr id="256" name="Google Shape;256;p31"/>
+          <p:cNvCxnSpPr>
+            <a:stCxn id="250" idx="2"/>
+            <a:endCxn id="251" idx="3"/>
+          </p:cNvCxnSpPr>
+          <p:nvPr/>
+        </p:nvCxnSpPr>
+        <p:spPr>
+          <a:xfrm>
+            <a:off x="4921275" y="1374225"/>
+            <a:ext cx="287100" cy="2126700"/>
+          </a:xfrm>
+          <a:prstGeom prst="curvedConnector5">
+            <a:avLst>
+              <a:gd fmla="val -82941" name="adj1"/>
+              <a:gd fmla="val 48696" name="adj2"/>
+              <a:gd fmla="val 182968" name="adj3"/>
+            </a:avLst>
+          </a:prstGeom>
+          <a:noFill/>
+          <a:ln cap="flat" cmpd="sng" w="28575">
+            <a:solidFill>
+              <a:schemeClr val="dk2"/>
+            </a:solidFill>
+            <a:prstDash val="solid"/>
+            <a:round/>
+            <a:headEnd len="med" w="med" type="none"/>
+            <a:tailEnd len="med" w="med" type="triangle"/>
+          </a:ln>
+        </p:spPr>
+      </p:cxnSp>
     </p:spTree>
   </p:cSld>
   <p:clrMapOvr>
@@ -12479,7 +11762,844 @@
   <p:cSld>
     <p:spTree>
       <p:nvGrpSpPr>
-        <p:cNvPr id="277" name="Shape 277"/>
+        <p:cNvPr id="260" name="Shape 260"/>
+        <p:cNvGrpSpPr/>
+        <p:nvPr/>
+      </p:nvGrpSpPr>
+      <p:grpSpPr>
+        <a:xfrm>
+          <a:off x="0" y="0"/>
+          <a:ext cx="0" cy="0"/>
+          <a:chOff x="0" y="0"/>
+          <a:chExt cx="0" cy="0"/>
+        </a:xfrm>
+      </p:grpSpPr>
+      <p:sp>
+        <p:nvSpPr>
+          <p:cNvPr id="261" name="Google Shape;261;p32"/>
+          <p:cNvSpPr/>
+          <p:nvPr/>
+        </p:nvSpPr>
+        <p:spPr>
+          <a:xfrm>
+            <a:off x="3703350" y="2938175"/>
+            <a:ext cx="1714500" cy="1125600"/>
+          </a:xfrm>
+          <a:prstGeom prst="roundRect">
+            <a:avLst>
+              <a:gd fmla="val 16667" name="adj"/>
+            </a:avLst>
+          </a:prstGeom>
+          <a:solidFill>
+            <a:schemeClr val="lt2"/>
+          </a:solidFill>
+          <a:ln cap="flat" cmpd="sng" w="9525">
+            <a:solidFill>
+              <a:schemeClr val="dk2"/>
+            </a:solidFill>
+            <a:prstDash val="solid"/>
+            <a:round/>
+            <a:headEnd len="sm" w="sm" type="none"/>
+            <a:tailEnd len="sm" w="sm" type="none"/>
+          </a:ln>
+        </p:spPr>
+        <p:txBody>
+          <a:bodyPr anchorCtr="0" anchor="ctr" bIns="91425" lIns="91425" spcFirstLastPara="1" rIns="91425" wrap="square" tIns="91425">
+            <a:noAutofit/>
+          </a:bodyPr>
+          <a:lstStyle/>
+          <a:p>
+            <a:pPr indent="0" lvl="0" marL="0" rtl="0" algn="l">
+              <a:spcBef>
+                <a:spcPts val="0"/>
+              </a:spcBef>
+              <a:spcAft>
+                <a:spcPts val="0"/>
+              </a:spcAft>
+              <a:buNone/>
+            </a:pPr>
+            <a:r>
+              <a:t/>
+            </a:r>
+            <a:endParaRPr/>
+          </a:p>
+        </p:txBody>
+      </p:sp>
+      <p:sp>
+        <p:nvSpPr>
+          <p:cNvPr id="262" name="Google Shape;262;p32"/>
+          <p:cNvSpPr/>
+          <p:nvPr/>
+        </p:nvSpPr>
+        <p:spPr>
+          <a:xfrm>
+            <a:off x="7721950" y="1060100"/>
+            <a:ext cx="863784" cy="628236"/>
+          </a:xfrm>
+          <a:prstGeom prst="flowChartMultidocument">
+            <a:avLst/>
+          </a:prstGeom>
+          <a:solidFill>
+            <a:srgbClr val="F6B26B"/>
+          </a:solidFill>
+          <a:ln cap="flat" cmpd="sng" w="9525">
+            <a:solidFill>
+              <a:schemeClr val="dk2"/>
+            </a:solidFill>
+            <a:prstDash val="solid"/>
+            <a:round/>
+            <a:headEnd len="sm" w="sm" type="none"/>
+            <a:tailEnd len="sm" w="sm" type="none"/>
+          </a:ln>
+        </p:spPr>
+        <p:txBody>
+          <a:bodyPr anchorCtr="0" anchor="ctr" bIns="91425" lIns="91425" spcFirstLastPara="1" rIns="91425" wrap="square" tIns="91425">
+            <a:noAutofit/>
+          </a:bodyPr>
+          <a:lstStyle/>
+          <a:p>
+            <a:pPr indent="0" lvl="0" marL="0" rtl="0" algn="l">
+              <a:spcBef>
+                <a:spcPts val="0"/>
+              </a:spcBef>
+              <a:spcAft>
+                <a:spcPts val="0"/>
+              </a:spcAft>
+              <a:buNone/>
+            </a:pPr>
+            <a:r>
+              <a:t/>
+            </a:r>
+            <a:endParaRPr/>
+          </a:p>
+        </p:txBody>
+      </p:sp>
+      <p:sp>
+        <p:nvSpPr>
+          <p:cNvPr id="263" name="Google Shape;263;p32"/>
+          <p:cNvSpPr/>
+          <p:nvPr/>
+        </p:nvSpPr>
+        <p:spPr>
+          <a:xfrm>
+            <a:off x="6151400" y="991263"/>
+            <a:ext cx="1204200" cy="765900"/>
+          </a:xfrm>
+          <a:prstGeom prst="rect">
+            <a:avLst/>
+          </a:prstGeom>
+          <a:solidFill>
+            <a:srgbClr val="F6B26B"/>
+          </a:solidFill>
+          <a:ln cap="flat" cmpd="sng" w="9525">
+            <a:solidFill>
+              <a:schemeClr val="dk2"/>
+            </a:solidFill>
+            <a:prstDash val="solid"/>
+            <a:round/>
+            <a:headEnd len="sm" w="sm" type="none"/>
+            <a:tailEnd len="sm" w="sm" type="none"/>
+          </a:ln>
+        </p:spPr>
+        <p:txBody>
+          <a:bodyPr anchorCtr="0" anchor="ctr" bIns="91425" lIns="91425" spcFirstLastPara="1" rIns="91425" wrap="square" tIns="91425">
+            <a:noAutofit/>
+          </a:bodyPr>
+          <a:lstStyle/>
+          <a:p>
+            <a:pPr indent="0" lvl="0" marL="0" rtl="0" algn="ctr">
+              <a:spcBef>
+                <a:spcPts val="0"/>
+              </a:spcBef>
+              <a:spcAft>
+                <a:spcPts val="0"/>
+              </a:spcAft>
+              <a:buNone/>
+            </a:pPr>
+            <a:r>
+              <a:rPr lang="es-419">
+                <a:latin typeface="Oswald"/>
+                <a:ea typeface="Oswald"/>
+                <a:cs typeface="Oswald"/>
+                <a:sym typeface="Oswald"/>
+              </a:rPr>
+              <a:t>SERVICIO</a:t>
+            </a:r>
+            <a:endParaRPr>
+              <a:latin typeface="Oswald"/>
+              <a:ea typeface="Oswald"/>
+              <a:cs typeface="Oswald"/>
+              <a:sym typeface="Oswald"/>
+            </a:endParaRPr>
+          </a:p>
+        </p:txBody>
+      </p:sp>
+      <p:sp>
+        <p:nvSpPr>
+          <p:cNvPr id="264" name="Google Shape;264;p32"/>
+          <p:cNvSpPr/>
+          <p:nvPr/>
+        </p:nvSpPr>
+        <p:spPr>
+          <a:xfrm>
+            <a:off x="4921275" y="991275"/>
+            <a:ext cx="863700" cy="765900"/>
+          </a:xfrm>
+          <a:prstGeom prst="ellipse">
+            <a:avLst/>
+          </a:prstGeom>
+          <a:solidFill>
+            <a:srgbClr val="F9CB9C"/>
+          </a:solidFill>
+          <a:ln cap="flat" cmpd="sng" w="9525">
+            <a:solidFill>
+              <a:schemeClr val="dk2"/>
+            </a:solidFill>
+            <a:prstDash val="solid"/>
+            <a:round/>
+            <a:headEnd len="sm" w="sm" type="none"/>
+            <a:tailEnd len="sm" w="sm" type="none"/>
+          </a:ln>
+        </p:spPr>
+        <p:txBody>
+          <a:bodyPr anchorCtr="0" anchor="ctr" bIns="91425" lIns="91425" spcFirstLastPara="1" rIns="91425" wrap="square" tIns="91425">
+            <a:noAutofit/>
+          </a:bodyPr>
+          <a:lstStyle/>
+          <a:p>
+            <a:pPr indent="0" lvl="0" marL="0" rtl="0" algn="ctr">
+              <a:spcBef>
+                <a:spcPts val="0"/>
+              </a:spcBef>
+              <a:spcAft>
+                <a:spcPts val="0"/>
+              </a:spcAft>
+              <a:buNone/>
+            </a:pPr>
+            <a:r>
+              <a:rPr lang="es-419">
+                <a:latin typeface="Oswald"/>
+                <a:ea typeface="Oswald"/>
+                <a:cs typeface="Oswald"/>
+                <a:sym typeface="Oswald"/>
+              </a:rPr>
+              <a:t>JSON</a:t>
+            </a:r>
+            <a:endParaRPr>
+              <a:latin typeface="Oswald"/>
+              <a:ea typeface="Oswald"/>
+              <a:cs typeface="Oswald"/>
+              <a:sym typeface="Oswald"/>
+            </a:endParaRPr>
+          </a:p>
+        </p:txBody>
+      </p:sp>
+      <p:sp>
+        <p:nvSpPr>
+          <p:cNvPr id="265" name="Google Shape;265;p32"/>
+          <p:cNvSpPr/>
+          <p:nvPr/>
+        </p:nvSpPr>
+        <p:spPr>
+          <a:xfrm>
+            <a:off x="558275" y="1060113"/>
+            <a:ext cx="863784" cy="628236"/>
+          </a:xfrm>
+          <a:prstGeom prst="flowChartMultidocument">
+            <a:avLst/>
+          </a:prstGeom>
+          <a:solidFill>
+            <a:srgbClr val="00FF00">
+              <a:alpha val="23720"/>
+            </a:srgbClr>
+          </a:solidFill>
+          <a:ln cap="flat" cmpd="sng" w="9525">
+            <a:solidFill>
+              <a:schemeClr val="dk2"/>
+            </a:solidFill>
+            <a:prstDash val="solid"/>
+            <a:round/>
+            <a:headEnd len="sm" w="sm" type="none"/>
+            <a:tailEnd len="sm" w="sm" type="none"/>
+          </a:ln>
+        </p:spPr>
+        <p:txBody>
+          <a:bodyPr anchorCtr="0" anchor="ctr" bIns="91425" lIns="91425" spcFirstLastPara="1" rIns="91425" wrap="square" tIns="91425">
+            <a:noAutofit/>
+          </a:bodyPr>
+          <a:lstStyle/>
+          <a:p>
+            <a:pPr indent="0" lvl="0" marL="0" rtl="0" algn="l">
+              <a:spcBef>
+                <a:spcPts val="0"/>
+              </a:spcBef>
+              <a:spcAft>
+                <a:spcPts val="0"/>
+              </a:spcAft>
+              <a:buNone/>
+            </a:pPr>
+            <a:r>
+              <a:t/>
+            </a:r>
+            <a:endParaRPr/>
+          </a:p>
+        </p:txBody>
+      </p:sp>
+      <p:sp>
+        <p:nvSpPr>
+          <p:cNvPr id="266" name="Google Shape;266;p32"/>
+          <p:cNvSpPr/>
+          <p:nvPr/>
+        </p:nvSpPr>
+        <p:spPr>
+          <a:xfrm>
+            <a:off x="1713117" y="991275"/>
+            <a:ext cx="1204200" cy="765900"/>
+          </a:xfrm>
+          <a:prstGeom prst="rect">
+            <a:avLst/>
+          </a:prstGeom>
+          <a:solidFill>
+            <a:srgbClr val="00FF00">
+              <a:alpha val="23720"/>
+            </a:srgbClr>
+          </a:solidFill>
+          <a:ln cap="flat" cmpd="sng" w="9525">
+            <a:solidFill>
+              <a:schemeClr val="dk2"/>
+            </a:solidFill>
+            <a:prstDash val="solid"/>
+            <a:round/>
+            <a:headEnd len="sm" w="sm" type="none"/>
+            <a:tailEnd len="sm" w="sm" type="none"/>
+          </a:ln>
+        </p:spPr>
+        <p:txBody>
+          <a:bodyPr anchorCtr="0" anchor="ctr" bIns="91425" lIns="91425" spcFirstLastPara="1" rIns="91425" wrap="square" tIns="91425">
+            <a:noAutofit/>
+          </a:bodyPr>
+          <a:lstStyle/>
+          <a:p>
+            <a:pPr indent="0" lvl="0" marL="0" rtl="0" algn="ctr">
+              <a:spcBef>
+                <a:spcPts val="0"/>
+              </a:spcBef>
+              <a:spcAft>
+                <a:spcPts val="0"/>
+              </a:spcAft>
+              <a:buNone/>
+            </a:pPr>
+            <a:r>
+              <a:rPr lang="es-419">
+                <a:latin typeface="Oswald"/>
+                <a:ea typeface="Oswald"/>
+                <a:cs typeface="Oswald"/>
+                <a:sym typeface="Oswald"/>
+              </a:rPr>
+              <a:t>BUILD</a:t>
+            </a:r>
+            <a:endParaRPr>
+              <a:latin typeface="Oswald"/>
+              <a:ea typeface="Oswald"/>
+              <a:cs typeface="Oswald"/>
+              <a:sym typeface="Oswald"/>
+            </a:endParaRPr>
+          </a:p>
+        </p:txBody>
+      </p:sp>
+      <p:sp>
+        <p:nvSpPr>
+          <p:cNvPr id="267" name="Google Shape;267;p32"/>
+          <p:cNvSpPr/>
+          <p:nvPr/>
+        </p:nvSpPr>
+        <p:spPr>
+          <a:xfrm>
+            <a:off x="3912750" y="3062525"/>
+            <a:ext cx="1295700" cy="876900"/>
+          </a:xfrm>
+          <a:prstGeom prst="rect">
+            <a:avLst/>
+          </a:prstGeom>
+          <a:solidFill>
+            <a:srgbClr val="CFE2F3"/>
+          </a:solidFill>
+          <a:ln cap="flat" cmpd="sng" w="9525">
+            <a:solidFill>
+              <a:schemeClr val="dk2"/>
+            </a:solidFill>
+            <a:prstDash val="solid"/>
+            <a:round/>
+            <a:headEnd len="sm" w="sm" type="none"/>
+            <a:tailEnd len="sm" w="sm" type="none"/>
+          </a:ln>
+        </p:spPr>
+        <p:txBody>
+          <a:bodyPr anchorCtr="0" anchor="ctr" bIns="91425" lIns="91425" spcFirstLastPara="1" rIns="91425" wrap="square" tIns="91425">
+            <a:noAutofit/>
+          </a:bodyPr>
+          <a:lstStyle/>
+          <a:p>
+            <a:pPr indent="0" lvl="0" marL="0" rtl="0" algn="ctr">
+              <a:spcBef>
+                <a:spcPts val="0"/>
+              </a:spcBef>
+              <a:spcAft>
+                <a:spcPts val="0"/>
+              </a:spcAft>
+              <a:buNone/>
+            </a:pPr>
+            <a:r>
+              <a:rPr lang="es-419">
+                <a:latin typeface="Oswald"/>
+                <a:ea typeface="Oswald"/>
+                <a:cs typeface="Oswald"/>
+                <a:sym typeface="Oswald"/>
+              </a:rPr>
+              <a:t>NAVEGADOR</a:t>
+            </a:r>
+            <a:endParaRPr>
+              <a:latin typeface="Oswald"/>
+              <a:ea typeface="Oswald"/>
+              <a:cs typeface="Oswald"/>
+              <a:sym typeface="Oswald"/>
+            </a:endParaRPr>
+          </a:p>
+        </p:txBody>
+      </p:sp>
+      <p:cxnSp>
+        <p:nvCxnSpPr>
+          <p:cNvPr id="268" name="Google Shape;268;p32"/>
+          <p:cNvCxnSpPr>
+            <a:stCxn id="262" idx="1"/>
+            <a:endCxn id="263" idx="3"/>
+          </p:cNvCxnSpPr>
+          <p:nvPr/>
+        </p:nvCxnSpPr>
+        <p:spPr>
+          <a:xfrm rot="10800000">
+            <a:off x="7355650" y="1374218"/>
+            <a:ext cx="366300" cy="0"/>
+          </a:xfrm>
+          <a:prstGeom prst="straightConnector1">
+            <a:avLst/>
+          </a:prstGeom>
+          <a:noFill/>
+          <a:ln cap="flat" cmpd="sng" w="19050">
+            <a:solidFill>
+              <a:schemeClr val="dk2"/>
+            </a:solidFill>
+            <a:prstDash val="solid"/>
+            <a:round/>
+            <a:headEnd len="med" w="med" type="none"/>
+            <a:tailEnd len="med" w="med" type="triangle"/>
+          </a:ln>
+        </p:spPr>
+      </p:cxnSp>
+      <p:cxnSp>
+        <p:nvCxnSpPr>
+          <p:cNvPr id="269" name="Google Shape;269;p32"/>
+          <p:cNvCxnSpPr>
+            <a:stCxn id="263" idx="1"/>
+            <a:endCxn id="264" idx="6"/>
+          </p:cNvCxnSpPr>
+          <p:nvPr/>
+        </p:nvCxnSpPr>
+        <p:spPr>
+          <a:xfrm rot="10800000">
+            <a:off x="5785100" y="1374213"/>
+            <a:ext cx="366300" cy="0"/>
+          </a:xfrm>
+          <a:prstGeom prst="straightConnector1">
+            <a:avLst/>
+          </a:prstGeom>
+          <a:noFill/>
+          <a:ln cap="flat" cmpd="sng" w="19050">
+            <a:solidFill>
+              <a:schemeClr val="dk2"/>
+            </a:solidFill>
+            <a:prstDash val="solid"/>
+            <a:round/>
+            <a:headEnd len="med" w="med" type="none"/>
+            <a:tailEnd len="med" w="med" type="triangle"/>
+          </a:ln>
+        </p:spPr>
+      </p:cxnSp>
+      <p:cxnSp>
+        <p:nvCxnSpPr>
+          <p:cNvPr id="270" name="Google Shape;270;p32"/>
+          <p:cNvCxnSpPr>
+            <a:stCxn id="265" idx="3"/>
+            <a:endCxn id="266" idx="1"/>
+          </p:cNvCxnSpPr>
+          <p:nvPr/>
+        </p:nvCxnSpPr>
+        <p:spPr>
+          <a:xfrm>
+            <a:off x="1422059" y="1374231"/>
+            <a:ext cx="291000" cy="0"/>
+          </a:xfrm>
+          <a:prstGeom prst="straightConnector1">
+            <a:avLst/>
+          </a:prstGeom>
+          <a:noFill/>
+          <a:ln cap="flat" cmpd="sng" w="19050">
+            <a:solidFill>
+              <a:schemeClr val="dk2"/>
+            </a:solidFill>
+            <a:prstDash val="solid"/>
+            <a:round/>
+            <a:headEnd len="med" w="med" type="none"/>
+            <a:tailEnd len="med" w="med" type="triangle"/>
+          </a:ln>
+        </p:spPr>
+      </p:cxnSp>
+      <p:cxnSp>
+        <p:nvCxnSpPr>
+          <p:cNvPr id="271" name="Google Shape;271;p32"/>
+          <p:cNvCxnSpPr>
+            <a:stCxn id="266" idx="3"/>
+            <a:endCxn id="272" idx="2"/>
+          </p:cNvCxnSpPr>
+          <p:nvPr/>
+        </p:nvCxnSpPr>
+        <p:spPr>
+          <a:xfrm>
+            <a:off x="2917317" y="1374225"/>
+            <a:ext cx="291000" cy="0"/>
+          </a:xfrm>
+          <a:prstGeom prst="straightConnector1">
+            <a:avLst/>
+          </a:prstGeom>
+          <a:noFill/>
+          <a:ln cap="flat" cmpd="sng" w="19050">
+            <a:solidFill>
+              <a:schemeClr val="dk2"/>
+            </a:solidFill>
+            <a:prstDash val="solid"/>
+            <a:round/>
+            <a:headEnd len="med" w="med" type="none"/>
+            <a:tailEnd len="med" w="med" type="triangle"/>
+          </a:ln>
+        </p:spPr>
+      </p:cxnSp>
+      <p:sp>
+        <p:nvSpPr>
+          <p:cNvPr id="273" name="Google Shape;273;p32"/>
+          <p:cNvSpPr txBox="1"/>
+          <p:nvPr/>
+        </p:nvSpPr>
+        <p:spPr>
+          <a:xfrm>
+            <a:off x="4683150" y="366450"/>
+            <a:ext cx="3902700" cy="461700"/>
+          </a:xfrm>
+          <a:prstGeom prst="rect">
+            <a:avLst/>
+          </a:prstGeom>
+          <a:noFill/>
+          <a:ln>
+            <a:noFill/>
+          </a:ln>
+        </p:spPr>
+        <p:txBody>
+          <a:bodyPr anchorCtr="0" anchor="t" bIns="91425" lIns="91425" spcFirstLastPara="1" rIns="91425" wrap="square" tIns="91425">
+            <a:spAutoFit/>
+          </a:bodyPr>
+          <a:lstStyle/>
+          <a:p>
+            <a:pPr indent="0" lvl="0" marL="0" rtl="0" algn="ctr">
+              <a:spcBef>
+                <a:spcPts val="0"/>
+              </a:spcBef>
+              <a:spcAft>
+                <a:spcPts val="0"/>
+              </a:spcAft>
+              <a:buNone/>
+            </a:pPr>
+            <a:r>
+              <a:rPr lang="es-419" sz="1800">
+                <a:latin typeface="Oswald"/>
+                <a:ea typeface="Oswald"/>
+                <a:cs typeface="Oswald"/>
+                <a:sym typeface="Oswald"/>
+              </a:rPr>
+              <a:t>BACKEND: API REST</a:t>
+            </a:r>
+            <a:endParaRPr sz="1800">
+              <a:latin typeface="Oswald"/>
+              <a:ea typeface="Oswald"/>
+              <a:cs typeface="Oswald"/>
+              <a:sym typeface="Oswald"/>
+            </a:endParaRPr>
+          </a:p>
+        </p:txBody>
+      </p:sp>
+      <p:sp>
+        <p:nvSpPr>
+          <p:cNvPr id="274" name="Google Shape;274;p32"/>
+          <p:cNvSpPr txBox="1"/>
+          <p:nvPr/>
+        </p:nvSpPr>
+        <p:spPr>
+          <a:xfrm>
+            <a:off x="558275" y="366450"/>
+            <a:ext cx="3751800" cy="461700"/>
+          </a:xfrm>
+          <a:prstGeom prst="rect">
+            <a:avLst/>
+          </a:prstGeom>
+          <a:noFill/>
+          <a:ln>
+            <a:noFill/>
+          </a:ln>
+        </p:spPr>
+        <p:txBody>
+          <a:bodyPr anchorCtr="0" anchor="t" bIns="91425" lIns="91425" spcFirstLastPara="1" rIns="91425" wrap="square" tIns="91425">
+            <a:spAutoFit/>
+          </a:bodyPr>
+          <a:lstStyle/>
+          <a:p>
+            <a:pPr indent="0" lvl="0" marL="0" rtl="0" algn="ctr">
+              <a:spcBef>
+                <a:spcPts val="0"/>
+              </a:spcBef>
+              <a:spcAft>
+                <a:spcPts val="0"/>
+              </a:spcAft>
+              <a:buNone/>
+            </a:pPr>
+            <a:r>
+              <a:rPr lang="es-419" sz="1800">
+                <a:latin typeface="Oswald"/>
+                <a:ea typeface="Oswald"/>
+                <a:cs typeface="Oswald"/>
+                <a:sym typeface="Oswald"/>
+              </a:rPr>
+              <a:t>FRONTEND: SPA</a:t>
+            </a:r>
+            <a:endParaRPr sz="1800">
+              <a:latin typeface="Oswald"/>
+              <a:ea typeface="Oswald"/>
+              <a:cs typeface="Oswald"/>
+              <a:sym typeface="Oswald"/>
+            </a:endParaRPr>
+          </a:p>
+        </p:txBody>
+      </p:sp>
+      <p:sp>
+        <p:nvSpPr>
+          <p:cNvPr id="275" name="Google Shape;275;p32"/>
+          <p:cNvSpPr txBox="1"/>
+          <p:nvPr>
+            <p:ph idx="1" type="body"/>
+          </p:nvPr>
+        </p:nvSpPr>
+        <p:spPr>
+          <a:xfrm>
+            <a:off x="311700" y="4273200"/>
+            <a:ext cx="8497800" cy="765900"/>
+          </a:xfrm>
+          <a:prstGeom prst="rect">
+            <a:avLst/>
+          </a:prstGeom>
+        </p:spPr>
+        <p:txBody>
+          <a:bodyPr anchorCtr="0" anchor="t" bIns="91425" lIns="91425" spcFirstLastPara="1" rIns="91425" wrap="square" tIns="91425">
+            <a:normAutofit fontScale="77500" lnSpcReduction="10000"/>
+          </a:bodyPr>
+          <a:lstStyle/>
+          <a:p>
+            <a:pPr indent="0" lvl="0" marL="0" rtl="0" algn="ctr">
+              <a:spcBef>
+                <a:spcPts val="0"/>
+              </a:spcBef>
+              <a:spcAft>
+                <a:spcPts val="1200"/>
+              </a:spcAft>
+              <a:buNone/>
+            </a:pPr>
+            <a:r>
+              <a:rPr b="1" lang="es-419" sz="2400">
+                <a:latin typeface="Open Sans"/>
+                <a:ea typeface="Open Sans"/>
+                <a:cs typeface="Open Sans"/>
+                <a:sym typeface="Open Sans"/>
+              </a:rPr>
+              <a:t>Caso </a:t>
+            </a:r>
+            <a:r>
+              <a:rPr b="1" lang="es-419" sz="2400">
+                <a:solidFill>
+                  <a:srgbClr val="1155CC"/>
+                </a:solidFill>
+                <a:latin typeface="Open Sans"/>
+                <a:ea typeface="Open Sans"/>
+                <a:cs typeface="Open Sans"/>
+                <a:sym typeface="Open Sans"/>
+              </a:rPr>
+              <a:t>SPA - API REST</a:t>
+            </a:r>
+            <a:r>
+              <a:rPr b="1" lang="es-419" sz="2400">
+                <a:latin typeface="Open Sans"/>
+                <a:ea typeface="Open Sans"/>
+                <a:cs typeface="Open Sans"/>
+                <a:sym typeface="Open Sans"/>
+              </a:rPr>
+              <a:t>: el navegador muestra HTML proveniente del frontend, que consume data proveniente del backend</a:t>
+            </a:r>
+            <a:endParaRPr b="1" sz="2400">
+              <a:latin typeface="Open Sans"/>
+              <a:ea typeface="Open Sans"/>
+              <a:cs typeface="Open Sans"/>
+              <a:sym typeface="Open Sans"/>
+            </a:endParaRPr>
+          </a:p>
+        </p:txBody>
+      </p:sp>
+      <p:sp>
+        <p:nvSpPr>
+          <p:cNvPr id="276" name="Google Shape;276;p32"/>
+          <p:cNvSpPr/>
+          <p:nvPr/>
+        </p:nvSpPr>
+        <p:spPr>
+          <a:xfrm>
+            <a:off x="3171688" y="1060088"/>
+            <a:ext cx="863784" cy="628236"/>
+          </a:xfrm>
+          <a:prstGeom prst="flowChartMultidocument">
+            <a:avLst/>
+          </a:prstGeom>
+          <a:solidFill>
+            <a:srgbClr val="00FF00">
+              <a:alpha val="23720"/>
+            </a:srgbClr>
+          </a:solidFill>
+          <a:ln cap="flat" cmpd="sng" w="9525">
+            <a:solidFill>
+              <a:schemeClr val="dk2"/>
+            </a:solidFill>
+            <a:prstDash val="solid"/>
+            <a:round/>
+            <a:headEnd len="sm" w="sm" type="none"/>
+            <a:tailEnd len="sm" w="sm" type="none"/>
+          </a:ln>
+        </p:spPr>
+        <p:txBody>
+          <a:bodyPr anchorCtr="0" anchor="ctr" bIns="91425" lIns="91425" spcFirstLastPara="1" rIns="91425" wrap="square" tIns="91425">
+            <a:noAutofit/>
+          </a:bodyPr>
+          <a:lstStyle/>
+          <a:p>
+            <a:pPr indent="0" lvl="0" marL="0" rtl="0" algn="ctr">
+              <a:spcBef>
+                <a:spcPts val="0"/>
+              </a:spcBef>
+              <a:spcAft>
+                <a:spcPts val="0"/>
+              </a:spcAft>
+              <a:buNone/>
+            </a:pPr>
+            <a:r>
+              <a:rPr lang="es-419">
+                <a:latin typeface="Oswald"/>
+                <a:ea typeface="Oswald"/>
+                <a:cs typeface="Oswald"/>
+                <a:sym typeface="Oswald"/>
+              </a:rPr>
+              <a:t>HTML</a:t>
+            </a:r>
+            <a:endParaRPr>
+              <a:latin typeface="Oswald"/>
+              <a:ea typeface="Oswald"/>
+              <a:cs typeface="Oswald"/>
+              <a:sym typeface="Oswald"/>
+            </a:endParaRPr>
+          </a:p>
+        </p:txBody>
+      </p:sp>
+      <p:cxnSp>
+        <p:nvCxnSpPr>
+          <p:cNvPr id="277" name="Google Shape;277;p32"/>
+          <p:cNvCxnSpPr>
+            <a:stCxn id="276" idx="3"/>
+            <a:endCxn id="267" idx="1"/>
+          </p:cNvCxnSpPr>
+          <p:nvPr/>
+        </p:nvCxnSpPr>
+        <p:spPr>
+          <a:xfrm flipH="1">
+            <a:off x="3912772" y="1374206"/>
+            <a:ext cx="122700" cy="2126700"/>
+          </a:xfrm>
+          <a:prstGeom prst="curvedConnector5">
+            <a:avLst>
+              <a:gd fmla="val -194071" name="adj1"/>
+              <a:gd fmla="val 47048" name="adj2"/>
+              <a:gd fmla="val 294088" name="adj3"/>
+            </a:avLst>
+          </a:prstGeom>
+          <a:noFill/>
+          <a:ln cap="flat" cmpd="sng" w="28575">
+            <a:solidFill>
+              <a:schemeClr val="dk2"/>
+            </a:solidFill>
+            <a:prstDash val="solid"/>
+            <a:round/>
+            <a:headEnd len="med" w="med" type="none"/>
+            <a:tailEnd len="med" w="med" type="triangle"/>
+          </a:ln>
+        </p:spPr>
+      </p:cxnSp>
+      <p:cxnSp>
+        <p:nvCxnSpPr>
+          <p:cNvPr id="278" name="Google Shape;278;p32"/>
+          <p:cNvCxnSpPr>
+            <a:stCxn id="264" idx="2"/>
+            <a:endCxn id="267" idx="3"/>
+          </p:cNvCxnSpPr>
+          <p:nvPr/>
+        </p:nvCxnSpPr>
+        <p:spPr>
+          <a:xfrm>
+            <a:off x="4921275" y="1374225"/>
+            <a:ext cx="287100" cy="2126700"/>
+          </a:xfrm>
+          <a:prstGeom prst="curvedConnector5">
+            <a:avLst>
+              <a:gd fmla="val -82941" name="adj1"/>
+              <a:gd fmla="val 48696" name="adj2"/>
+              <a:gd fmla="val 182968" name="adj3"/>
+            </a:avLst>
+          </a:prstGeom>
+          <a:noFill/>
+          <a:ln cap="flat" cmpd="sng" w="28575">
+            <a:solidFill>
+              <a:schemeClr val="dk2"/>
+            </a:solidFill>
+            <a:prstDash val="solid"/>
+            <a:round/>
+            <a:headEnd len="med" w="med" type="none"/>
+            <a:tailEnd len="med" w="med" type="triangle"/>
+          </a:ln>
+        </p:spPr>
+      </p:cxnSp>
+    </p:spTree>
+  </p:cSld>
+  <p:clrMapOvr>
+    <a:masterClrMapping/>
+  </p:clrMapOvr>
+</p:sld>
+</file>
+
+<file path=ppt/slides/slide21.xml><?xml version="1.0" encoding="utf-8"?>
+<p:sld xmlns:a="http://schemas.openxmlformats.org/drawingml/2006/main" xmlns:r="http://schemas.openxmlformats.org/officeDocument/2006/relationships" xmlns:mc="http://schemas.openxmlformats.org/markup-compatibility/2006" xmlns:mv="urn:schemas-microsoft-com:mac:vml" xmlns:p="http://schemas.openxmlformats.org/presentationml/2006/main" xmlns:c="http://schemas.openxmlformats.org/drawingml/2006/chart" xmlns:dgm="http://schemas.openxmlformats.org/drawingml/2006/diagram" xmlns:o="urn:schemas-microsoft-com:office:office" xmlns:v="urn:schemas-microsoft-com:vml" xmlns:pvml="urn:schemas-microsoft-com:office:powerpoint" xmlns:com="http://schemas.openxmlformats.org/drawingml/2006/compatibility" xmlns:p14="http://schemas.microsoft.com/office/powerpoint/2010/main" xmlns:p15="http://schemas.microsoft.com/office/powerpoint/2012/main" xmlns:ahyp="http://schemas.microsoft.com/office/drawing/2018/hyperlinkcolor">
+  <p:cSld>
+    <p:spTree>
+      <p:nvGrpSpPr>
+        <p:cNvPr id="282" name="Shape 282"/>
         <p:cNvGrpSpPr/>
         <p:nvPr/>
       </p:nvGrpSpPr>
@@ -12493,7 +12613,7 @@
       </p:grpSpPr>
       <p:pic>
         <p:nvPicPr>
-          <p:cNvPr id="278" name="Google Shape;278;p32"/>
+          <p:cNvPr id="283" name="Google Shape;283;p33"/>
           <p:cNvPicPr preferRelativeResize="0"/>
           <p:nvPr/>
         </p:nvPicPr>
@@ -12521,7 +12641,7 @@
       </p:pic>
       <p:pic>
         <p:nvPicPr>
-          <p:cNvPr id="279" name="Google Shape;279;p32"/>
+          <p:cNvPr id="284" name="Google Shape;284;p33"/>
           <p:cNvPicPr preferRelativeResize="0"/>
           <p:nvPr/>
         </p:nvPicPr>
@@ -12547,71 +12667,6 @@
           </a:ln>
         </p:spPr>
       </p:pic>
-    </p:spTree>
-  </p:cSld>
-  <p:clrMapOvr>
-    <a:masterClrMapping/>
-  </p:clrMapOvr>
-</p:sld>
-</file>
-
-<file path=ppt/slides/slide21.xml><?xml version="1.0" encoding="utf-8"?>
-<p:sld xmlns:a="http://schemas.openxmlformats.org/drawingml/2006/main" xmlns:r="http://schemas.openxmlformats.org/officeDocument/2006/relationships" xmlns:mc="http://schemas.openxmlformats.org/markup-compatibility/2006" xmlns:mv="urn:schemas-microsoft-com:mac:vml" xmlns:p="http://schemas.openxmlformats.org/presentationml/2006/main" xmlns:c="http://schemas.openxmlformats.org/drawingml/2006/chart" xmlns:dgm="http://schemas.openxmlformats.org/drawingml/2006/diagram" xmlns:o="urn:schemas-microsoft-com:office:office" xmlns:v="urn:schemas-microsoft-com:vml" xmlns:pvml="urn:schemas-microsoft-com:office:powerpoint" xmlns:com="http://schemas.openxmlformats.org/drawingml/2006/compatibility" xmlns:p14="http://schemas.microsoft.com/office/powerpoint/2010/main" xmlns:p15="http://schemas.microsoft.com/office/powerpoint/2012/main" xmlns:ahyp="http://schemas.microsoft.com/office/drawing/2018/hyperlinkcolor">
-  <p:cSld>
-    <p:spTree>
-      <p:nvGrpSpPr>
-        <p:cNvPr id="283" name="Shape 283"/>
-        <p:cNvGrpSpPr/>
-        <p:nvPr/>
-      </p:nvGrpSpPr>
-      <p:grpSpPr>
-        <a:xfrm>
-          <a:off x="0" y="0"/>
-          <a:ext cx="0" cy="0"/>
-          <a:chOff x="0" y="0"/>
-          <a:chExt cx="0" cy="0"/>
-        </a:xfrm>
-      </p:grpSpPr>
-      <p:sp>
-        <p:nvSpPr>
-          <p:cNvPr id="284" name="Google Shape;284;p33"/>
-          <p:cNvSpPr txBox="1"/>
-          <p:nvPr>
-            <p:ph type="title"/>
-          </p:nvPr>
-        </p:nvSpPr>
-        <p:spPr>
-          <a:xfrm>
-            <a:off x="311700" y="2150850"/>
-            <a:ext cx="8520600" cy="841800"/>
-          </a:xfrm>
-          <a:prstGeom prst="rect">
-            <a:avLst/>
-          </a:prstGeom>
-        </p:spPr>
-        <p:txBody>
-          <a:bodyPr anchorCtr="0" anchor="ctr" bIns="91425" lIns="91425" spcFirstLastPara="1" rIns="91425" wrap="square" tIns="91425">
-            <a:normAutofit/>
-          </a:bodyPr>
-          <a:lstStyle/>
-          <a:p>
-            <a:pPr indent="0" lvl="0" marL="0" rtl="0" algn="ctr">
-              <a:spcBef>
-                <a:spcPts val="0"/>
-              </a:spcBef>
-              <a:spcAft>
-                <a:spcPts val="0"/>
-              </a:spcAft>
-              <a:buNone/>
-            </a:pPr>
-            <a:r>
-              <a:rPr lang="es-419"/>
-              <a:t>Gracias</a:t>
-            </a:r>
-            <a:endParaRPr/>
-          </a:p>
-        </p:txBody>
-      </p:sp>
     </p:spTree>
   </p:cSld>
   <p:clrMapOvr>
@@ -12647,180 +12702,31 @@
         </p:nvSpPr>
         <p:spPr>
           <a:xfrm>
-            <a:off x="311700" y="445025"/>
-            <a:ext cx="8520600" cy="572700"/>
+            <a:off x="311700" y="2150850"/>
+            <a:ext cx="8520600" cy="841800"/>
           </a:xfrm>
           <a:prstGeom prst="rect">
             <a:avLst/>
           </a:prstGeom>
         </p:spPr>
         <p:txBody>
-          <a:bodyPr anchorCtr="0" anchor="t" bIns="91425" lIns="91425" spcFirstLastPara="1" rIns="91425" wrap="square" tIns="91425">
-            <a:normAutofit fontScale="90000"/>
-          </a:bodyPr>
-          <a:lstStyle/>
-          <a:p>
-            <a:pPr indent="0" lvl="0" marL="0" rtl="0" algn="l">
-              <a:spcBef>
-                <a:spcPts val="0"/>
-              </a:spcBef>
-              <a:spcAft>
-                <a:spcPts val="0"/>
-              </a:spcAft>
-              <a:buNone/>
-            </a:pPr>
-            <a:r>
-              <a:rPr lang="es-419"/>
-              <a:t>Material de Referencia</a:t>
-            </a:r>
-            <a:endParaRPr/>
-          </a:p>
-        </p:txBody>
-      </p:sp>
-      <p:sp>
-        <p:nvSpPr>
-          <p:cNvPr id="290" name="Google Shape;290;p34"/>
-          <p:cNvSpPr txBox="1"/>
-          <p:nvPr>
-            <p:ph idx="1" type="body"/>
-          </p:nvPr>
-        </p:nvSpPr>
-        <p:spPr>
-          <a:xfrm>
-            <a:off x="311700" y="1152475"/>
-            <a:ext cx="8520600" cy="3416400"/>
-          </a:xfrm>
-          <a:prstGeom prst="rect">
-            <a:avLst/>
-          </a:prstGeom>
-        </p:spPr>
-        <p:txBody>
-          <a:bodyPr anchorCtr="0" anchor="t" bIns="91425" lIns="91425" spcFirstLastPara="1" rIns="91425" wrap="square" tIns="91425">
+          <a:bodyPr anchorCtr="0" anchor="ctr" bIns="91425" lIns="91425" spcFirstLastPara="1" rIns="91425" wrap="square" tIns="91425">
             <a:normAutofit/>
           </a:bodyPr>
           <a:lstStyle/>
           <a:p>
-            <a:pPr indent="-342900" lvl="0" marL="457200" rtl="0" algn="l">
-              <a:spcBef>
-                <a:spcPts val="0"/>
-              </a:spcBef>
-              <a:spcAft>
-                <a:spcPts val="0"/>
-              </a:spcAft>
-              <a:buSzPts val="1800"/>
-              <a:buChar char="●"/>
+            <a:pPr indent="0" lvl="0" marL="0" rtl="0" algn="ctr">
+              <a:spcBef>
+                <a:spcPts val="0"/>
+              </a:spcBef>
+              <a:spcAft>
+                <a:spcPts val="0"/>
+              </a:spcAft>
+              <a:buNone/>
             </a:pPr>
             <a:r>
-              <a:rPr lang="es-419" u="sng">
-                <a:solidFill>
-                  <a:schemeClr val="hlink"/>
-                </a:solidFill>
-                <a:hlinkClick r:id="rId3"/>
-              </a:rPr>
-              <a:t>https://github.com/akobashikawa/express-contacto</a:t>
-            </a:r>
-            <a:r>
               <a:rPr lang="es-419"/>
-              <a:t> </a:t>
-            </a:r>
-            <a:endParaRPr/>
-          </a:p>
-          <a:p>
-            <a:pPr indent="-317500" lvl="1" marL="914400" rtl="0" algn="l">
-              <a:spcBef>
-                <a:spcPts val="0"/>
-              </a:spcBef>
-              <a:spcAft>
-                <a:spcPts val="0"/>
-              </a:spcAft>
-              <a:buSzPts val="1400"/>
-              <a:buChar char="○"/>
-            </a:pPr>
-            <a:r>
-              <a:rPr lang="es-419"/>
-              <a:t>Formulario de Contacto con Express (MVC)</a:t>
-            </a:r>
-            <a:endParaRPr/>
-          </a:p>
-          <a:p>
-            <a:pPr indent="-342900" lvl="0" marL="457200" rtl="0" algn="l">
-              <a:spcBef>
-                <a:spcPts val="0"/>
-              </a:spcBef>
-              <a:spcAft>
-                <a:spcPts val="0"/>
-              </a:spcAft>
-              <a:buSzPts val="1800"/>
-              <a:buChar char="●"/>
-            </a:pPr>
-            <a:r>
-              <a:rPr lang="es-419" u="sng">
-                <a:solidFill>
-                  <a:schemeClr val="hlink"/>
-                </a:solidFill>
-                <a:hlinkClick r:id="rId4"/>
-              </a:rPr>
-              <a:t>https://expressjs.com/es/</a:t>
-            </a:r>
-            <a:r>
-              <a:rPr lang="es-419"/>
-              <a:t> </a:t>
-            </a:r>
-            <a:endParaRPr/>
-          </a:p>
-          <a:p>
-            <a:pPr indent="-317500" lvl="1" marL="914400" rtl="0" algn="l">
-              <a:spcBef>
-                <a:spcPts val="0"/>
-              </a:spcBef>
-              <a:spcAft>
-                <a:spcPts val="0"/>
-              </a:spcAft>
-              <a:buSzPts val="1400"/>
-              <a:buChar char="○"/>
-            </a:pPr>
-            <a:r>
-              <a:rPr lang="es-419"/>
-              <a:t>ExpressJS Framework</a:t>
-            </a:r>
-            <a:endParaRPr/>
-          </a:p>
-          <a:p>
-            <a:pPr indent="-342900" lvl="0" marL="457200" rtl="0" algn="l">
-              <a:spcBef>
-                <a:spcPts val="0"/>
-              </a:spcBef>
-              <a:spcAft>
-                <a:spcPts val="0"/>
-              </a:spcAft>
-              <a:buSzPts val="1800"/>
-              <a:buChar char="●"/>
-            </a:pPr>
-            <a:r>
-              <a:rPr lang="es-419" u="sng">
-                <a:solidFill>
-                  <a:schemeClr val="hlink"/>
-                </a:solidFill>
-                <a:hlinkClick r:id="rId5"/>
-              </a:rPr>
-              <a:t>https://render.com/</a:t>
-            </a:r>
-            <a:endParaRPr/>
-          </a:p>
-          <a:p>
-            <a:pPr indent="-317500" lvl="1" marL="914400" rtl="0" algn="l">
-              <a:spcBef>
-                <a:spcPts val="0"/>
-              </a:spcBef>
-              <a:spcAft>
-                <a:spcPts val="0"/>
-              </a:spcAft>
-              <a:buSzPts val="1400"/>
-              <a:buChar char="○"/>
-            </a:pPr>
-            <a:r>
-              <a:rPr lang="es-419"/>
-              <a:t>Para alojar web services en la nube</a:t>
+              <a:t>Gracias</a:t>
             </a:r>
             <a:endParaRPr/>
           </a:p>
@@ -12839,7 +12745,7 @@
   <p:cSld>
     <p:spTree>
       <p:nvGrpSpPr>
-        <p:cNvPr id="294" name="Shape 294"/>
+        <p:cNvPr id="293" name="Shape 293"/>
         <p:cNvGrpSpPr/>
         <p:nvPr/>
       </p:nvGrpSpPr>
@@ -12853,7 +12759,221 @@
       </p:grpSpPr>
       <p:sp>
         <p:nvSpPr>
+          <p:cNvPr id="294" name="Google Shape;294;p35"/>
+          <p:cNvSpPr txBox="1"/>
+          <p:nvPr>
+            <p:ph type="title"/>
+          </p:nvPr>
+        </p:nvSpPr>
+        <p:spPr>
+          <a:xfrm>
+            <a:off x="311700" y="445025"/>
+            <a:ext cx="8520600" cy="572700"/>
+          </a:xfrm>
+          <a:prstGeom prst="rect">
+            <a:avLst/>
+          </a:prstGeom>
+        </p:spPr>
+        <p:txBody>
+          <a:bodyPr anchorCtr="0" anchor="t" bIns="91425" lIns="91425" spcFirstLastPara="1" rIns="91425" wrap="square" tIns="91425">
+            <a:normAutofit fontScale="90000"/>
+          </a:bodyPr>
+          <a:lstStyle/>
+          <a:p>
+            <a:pPr indent="0" lvl="0" marL="0" rtl="0" algn="l">
+              <a:spcBef>
+                <a:spcPts val="0"/>
+              </a:spcBef>
+              <a:spcAft>
+                <a:spcPts val="0"/>
+              </a:spcAft>
+              <a:buNone/>
+            </a:pPr>
+            <a:r>
+              <a:rPr lang="es-419"/>
+              <a:t>Material de Referencia</a:t>
+            </a:r>
+            <a:endParaRPr/>
+          </a:p>
+        </p:txBody>
+      </p:sp>
+      <p:sp>
+        <p:nvSpPr>
           <p:cNvPr id="295" name="Google Shape;295;p35"/>
+          <p:cNvSpPr txBox="1"/>
+          <p:nvPr>
+            <p:ph idx="1" type="body"/>
+          </p:nvPr>
+        </p:nvSpPr>
+        <p:spPr>
+          <a:xfrm>
+            <a:off x="311700" y="1152475"/>
+            <a:ext cx="8520600" cy="3416400"/>
+          </a:xfrm>
+          <a:prstGeom prst="rect">
+            <a:avLst/>
+          </a:prstGeom>
+        </p:spPr>
+        <p:txBody>
+          <a:bodyPr anchorCtr="0" anchor="t" bIns="91425" lIns="91425" spcFirstLastPara="1" rIns="91425" wrap="square" tIns="91425">
+            <a:normAutofit/>
+          </a:bodyPr>
+          <a:lstStyle/>
+          <a:p>
+            <a:pPr indent="-342900" lvl="0" marL="457200" rtl="0" algn="l">
+              <a:spcBef>
+                <a:spcPts val="0"/>
+              </a:spcBef>
+              <a:spcAft>
+                <a:spcPts val="0"/>
+              </a:spcAft>
+              <a:buSzPts val="1800"/>
+              <a:buChar char="●"/>
+            </a:pPr>
+            <a:r>
+              <a:rPr lang="es-419" u="sng">
+                <a:solidFill>
+                  <a:schemeClr val="hlink"/>
+                </a:solidFill>
+                <a:hlinkClick r:id="rId3"/>
+              </a:rPr>
+              <a:t>https://github.com/akobashikawa/express-contacto</a:t>
+            </a:r>
+            <a:r>
+              <a:rPr lang="es-419"/>
+              <a:t> </a:t>
+            </a:r>
+            <a:endParaRPr/>
+          </a:p>
+          <a:p>
+            <a:pPr indent="-317500" lvl="1" marL="914400" rtl="0" algn="l">
+              <a:spcBef>
+                <a:spcPts val="0"/>
+              </a:spcBef>
+              <a:spcAft>
+                <a:spcPts val="0"/>
+              </a:spcAft>
+              <a:buSzPts val="1400"/>
+              <a:buChar char="○"/>
+            </a:pPr>
+            <a:r>
+              <a:rPr lang="es-419"/>
+              <a:t>Formulario de Contacto con Express (MVC)</a:t>
+            </a:r>
+            <a:endParaRPr/>
+          </a:p>
+          <a:p>
+            <a:pPr indent="-342900" lvl="0" marL="457200" rtl="0" algn="l">
+              <a:spcBef>
+                <a:spcPts val="0"/>
+              </a:spcBef>
+              <a:spcAft>
+                <a:spcPts val="0"/>
+              </a:spcAft>
+              <a:buSzPts val="1800"/>
+              <a:buChar char="●"/>
+            </a:pPr>
+            <a:r>
+              <a:rPr lang="es-419" u="sng">
+                <a:solidFill>
+                  <a:schemeClr val="hlink"/>
+                </a:solidFill>
+                <a:hlinkClick r:id="rId4"/>
+              </a:rPr>
+              <a:t>https://expressjs.com/es/</a:t>
+            </a:r>
+            <a:r>
+              <a:rPr lang="es-419"/>
+              <a:t> </a:t>
+            </a:r>
+            <a:endParaRPr/>
+          </a:p>
+          <a:p>
+            <a:pPr indent="-317500" lvl="1" marL="914400" rtl="0" algn="l">
+              <a:spcBef>
+                <a:spcPts val="0"/>
+              </a:spcBef>
+              <a:spcAft>
+                <a:spcPts val="0"/>
+              </a:spcAft>
+              <a:buSzPts val="1400"/>
+              <a:buChar char="○"/>
+            </a:pPr>
+            <a:r>
+              <a:rPr lang="es-419"/>
+              <a:t>ExpressJS Framework</a:t>
+            </a:r>
+            <a:endParaRPr/>
+          </a:p>
+          <a:p>
+            <a:pPr indent="-342900" lvl="0" marL="457200" rtl="0" algn="l">
+              <a:spcBef>
+                <a:spcPts val="0"/>
+              </a:spcBef>
+              <a:spcAft>
+                <a:spcPts val="0"/>
+              </a:spcAft>
+              <a:buSzPts val="1800"/>
+              <a:buChar char="●"/>
+            </a:pPr>
+            <a:r>
+              <a:rPr lang="es-419" u="sng">
+                <a:solidFill>
+                  <a:schemeClr val="hlink"/>
+                </a:solidFill>
+                <a:hlinkClick r:id="rId5"/>
+              </a:rPr>
+              <a:t>https://render.com/</a:t>
+            </a:r>
+            <a:endParaRPr/>
+          </a:p>
+          <a:p>
+            <a:pPr indent="-317500" lvl="1" marL="914400" rtl="0" algn="l">
+              <a:spcBef>
+                <a:spcPts val="0"/>
+              </a:spcBef>
+              <a:spcAft>
+                <a:spcPts val="0"/>
+              </a:spcAft>
+              <a:buSzPts val="1400"/>
+              <a:buChar char="○"/>
+            </a:pPr>
+            <a:r>
+              <a:rPr lang="es-419"/>
+              <a:t>Para alojar web services en la nube</a:t>
+            </a:r>
+            <a:endParaRPr/>
+          </a:p>
+        </p:txBody>
+      </p:sp>
+    </p:spTree>
+  </p:cSld>
+  <p:clrMapOvr>
+    <a:masterClrMapping/>
+  </p:clrMapOvr>
+</p:sld>
+</file>
+
+<file path=ppt/slides/slide24.xml><?xml version="1.0" encoding="utf-8"?>
+<p:sld xmlns:a="http://schemas.openxmlformats.org/drawingml/2006/main" xmlns:r="http://schemas.openxmlformats.org/officeDocument/2006/relationships" xmlns:mc="http://schemas.openxmlformats.org/markup-compatibility/2006" xmlns:mv="urn:schemas-microsoft-com:mac:vml" xmlns:p="http://schemas.openxmlformats.org/presentationml/2006/main" xmlns:c="http://schemas.openxmlformats.org/drawingml/2006/chart" xmlns:dgm="http://schemas.openxmlformats.org/drawingml/2006/diagram" xmlns:o="urn:schemas-microsoft-com:office:office" xmlns:v="urn:schemas-microsoft-com:vml" xmlns:pvml="urn:schemas-microsoft-com:office:powerpoint" xmlns:com="http://schemas.openxmlformats.org/drawingml/2006/compatibility" xmlns:p14="http://schemas.microsoft.com/office/powerpoint/2010/main" xmlns:p15="http://schemas.microsoft.com/office/powerpoint/2012/main" xmlns:ahyp="http://schemas.microsoft.com/office/drawing/2018/hyperlinkcolor">
+  <p:cSld>
+    <p:spTree>
+      <p:nvGrpSpPr>
+        <p:cNvPr id="299" name="Shape 299"/>
+        <p:cNvGrpSpPr/>
+        <p:nvPr/>
+      </p:nvGrpSpPr>
+      <p:grpSpPr>
+        <a:xfrm>
+          <a:off x="0" y="0"/>
+          <a:ext cx="0" cy="0"/>
+          <a:chOff x="0" y="0"/>
+          <a:chExt cx="0" cy="0"/>
+        </a:xfrm>
+      </p:grpSpPr>
+      <p:sp>
+        <p:nvSpPr>
+          <p:cNvPr id="300" name="Google Shape;300;p36"/>
           <p:cNvSpPr txBox="1"/>
           <p:nvPr>
             <p:ph type="title"/>

</xml_diff>